<commit_message>
updating presentation and readme
</commit_message>
<xml_diff>
--- a/Project3Presentation.pptx
+++ b/Project3Presentation.pptx
@@ -11,12 +11,11 @@
     <p:sldId id="261" r:id="rId5"/>
     <p:sldId id="267" r:id="rId6"/>
     <p:sldId id="260" r:id="rId7"/>
-    <p:sldId id="265" r:id="rId8"/>
-    <p:sldId id="263" r:id="rId9"/>
-    <p:sldId id="268" r:id="rId10"/>
-    <p:sldId id="269" r:id="rId11"/>
-    <p:sldId id="264" r:id="rId12"/>
-    <p:sldId id="266" r:id="rId13"/>
+    <p:sldId id="271" r:id="rId8"/>
+    <p:sldId id="268" r:id="rId9"/>
+    <p:sldId id="269" r:id="rId10"/>
+    <p:sldId id="264" r:id="rId11"/>
+    <p:sldId id="266" r:id="rId12"/>
   </p:sldIdLst>
   <p:sldSz cx="12192000" cy="6858000"/>
   <p:notesSz cx="6858000" cy="9144000"/>
@@ -121,6 +120,272 @@
     </p:ext>
   </p:extLst>
 </p:presentation>
+</file>
+
+<file path=ppt/changesInfos/changesInfo1.xml><?xml version="1.0" encoding="utf-8"?>
+<pc:chgInfo xmlns:a="http://schemas.openxmlformats.org/drawingml/2006/main" xmlns:r="http://schemas.openxmlformats.org/officeDocument/2006/relationships" xmlns:ac="http://schemas.microsoft.com/office/drawing/2013/main/command" xmlns:pc="http://schemas.microsoft.com/office/powerpoint/2013/main/command">
+  <pc:docChgLst>
+    <pc:chgData name="Rebecca Ngooi" userId="1f97d8b7894e3c19" providerId="LiveId" clId="{E919E623-3C73-48DF-8900-CCE3CBBED04B}"/>
+    <pc:docChg chg="undo custSel addSld delSld modSld sldOrd">
+      <pc:chgData name="Rebecca Ngooi" userId="1f97d8b7894e3c19" providerId="LiveId" clId="{E919E623-3C73-48DF-8900-CCE3CBBED04B}" dt="2023-07-10T12:39:24.315" v="845" actId="20577"/>
+      <pc:docMkLst>
+        <pc:docMk/>
+      </pc:docMkLst>
+      <pc:sldChg chg="modSp mod">
+        <pc:chgData name="Rebecca Ngooi" userId="1f97d8b7894e3c19" providerId="LiveId" clId="{E919E623-3C73-48DF-8900-CCE3CBBED04B}" dt="2023-07-10T12:06:52.525" v="669" actId="27636"/>
+        <pc:sldMkLst>
+          <pc:docMk/>
+          <pc:sldMk cId="467619623" sldId="257"/>
+        </pc:sldMkLst>
+        <pc:spChg chg="mod">
+          <ac:chgData name="Rebecca Ngooi" userId="1f97d8b7894e3c19" providerId="LiveId" clId="{E919E623-3C73-48DF-8900-CCE3CBBED04B}" dt="2023-07-10T12:06:52.525" v="669" actId="27636"/>
+          <ac:spMkLst>
+            <pc:docMk/>
+            <pc:sldMk cId="467619623" sldId="257"/>
+            <ac:spMk id="3" creationId="{006E071B-4E4E-F9EA-4959-A4978E29789C}"/>
+          </ac:spMkLst>
+        </pc:spChg>
+      </pc:sldChg>
+      <pc:sldChg chg="modSp mod">
+        <pc:chgData name="Rebecca Ngooi" userId="1f97d8b7894e3c19" providerId="LiveId" clId="{E919E623-3C73-48DF-8900-CCE3CBBED04B}" dt="2023-07-10T11:43:20.556" v="23" actId="20577"/>
+        <pc:sldMkLst>
+          <pc:docMk/>
+          <pc:sldMk cId="2237463810" sldId="258"/>
+        </pc:sldMkLst>
+        <pc:spChg chg="mod">
+          <ac:chgData name="Rebecca Ngooi" userId="1f97d8b7894e3c19" providerId="LiveId" clId="{E919E623-3C73-48DF-8900-CCE3CBBED04B}" dt="2023-07-10T11:43:20.556" v="23" actId="20577"/>
+          <ac:spMkLst>
+            <pc:docMk/>
+            <pc:sldMk cId="2237463810" sldId="258"/>
+            <ac:spMk id="6" creationId="{86BA601E-A6F3-8FCF-91B2-111F25472EA6}"/>
+          </ac:spMkLst>
+        </pc:spChg>
+      </pc:sldChg>
+      <pc:sldChg chg="modSp mod">
+        <pc:chgData name="Rebecca Ngooi" userId="1f97d8b7894e3c19" providerId="LiveId" clId="{E919E623-3C73-48DF-8900-CCE3CBBED04B}" dt="2023-07-10T11:51:24.670" v="260" actId="1076"/>
+        <pc:sldMkLst>
+          <pc:docMk/>
+          <pc:sldMk cId="3080397855" sldId="259"/>
+        </pc:sldMkLst>
+        <pc:spChg chg="mod">
+          <ac:chgData name="Rebecca Ngooi" userId="1f97d8b7894e3c19" providerId="LiveId" clId="{E919E623-3C73-48DF-8900-CCE3CBBED04B}" dt="2023-07-10T11:51:13.698" v="258" actId="113"/>
+          <ac:spMkLst>
+            <pc:docMk/>
+            <pc:sldMk cId="3080397855" sldId="259"/>
+            <ac:spMk id="3" creationId="{BF7D3F9E-9875-B064-A61F-4D28C89939C8}"/>
+          </ac:spMkLst>
+        </pc:spChg>
+        <pc:picChg chg="mod">
+          <ac:chgData name="Rebecca Ngooi" userId="1f97d8b7894e3c19" providerId="LiveId" clId="{E919E623-3C73-48DF-8900-CCE3CBBED04B}" dt="2023-07-10T11:51:24.670" v="260" actId="1076"/>
+          <ac:picMkLst>
+            <pc:docMk/>
+            <pc:sldMk cId="3080397855" sldId="259"/>
+            <ac:picMk id="2" creationId="{A9FA5618-4EED-C1E2-68B1-E8E6886B75DA}"/>
+          </ac:picMkLst>
+        </pc:picChg>
+      </pc:sldChg>
+      <pc:sldChg chg="modSp mod">
+        <pc:chgData name="Rebecca Ngooi" userId="1f97d8b7894e3c19" providerId="LiveId" clId="{E919E623-3C73-48DF-8900-CCE3CBBED04B}" dt="2023-07-10T12:39:24.315" v="845" actId="20577"/>
+        <pc:sldMkLst>
+          <pc:docMk/>
+          <pc:sldMk cId="1090978945" sldId="260"/>
+        </pc:sldMkLst>
+        <pc:spChg chg="mod">
+          <ac:chgData name="Rebecca Ngooi" userId="1f97d8b7894e3c19" providerId="LiveId" clId="{E919E623-3C73-48DF-8900-CCE3CBBED04B}" dt="2023-07-10T12:06:24.908" v="655" actId="20577"/>
+          <ac:spMkLst>
+            <pc:docMk/>
+            <pc:sldMk cId="1090978945" sldId="260"/>
+            <ac:spMk id="2" creationId="{5088FF0C-BE12-1258-DEFF-7AB3E7FE7487}"/>
+          </ac:spMkLst>
+        </pc:spChg>
+        <pc:spChg chg="mod">
+          <ac:chgData name="Rebecca Ngooi" userId="1f97d8b7894e3c19" providerId="LiveId" clId="{E919E623-3C73-48DF-8900-CCE3CBBED04B}" dt="2023-07-10T12:39:24.315" v="845" actId="20577"/>
+          <ac:spMkLst>
+            <pc:docMk/>
+            <pc:sldMk cId="1090978945" sldId="260"/>
+            <ac:spMk id="3" creationId="{E57B7165-57F4-26B5-B164-4914825A3BE8}"/>
+          </ac:spMkLst>
+        </pc:spChg>
+        <pc:picChg chg="mod">
+          <ac:chgData name="Rebecca Ngooi" userId="1f97d8b7894e3c19" providerId="LiveId" clId="{E919E623-3C73-48DF-8900-CCE3CBBED04B}" dt="2023-07-10T11:46:09.921" v="35" actId="1076"/>
+          <ac:picMkLst>
+            <pc:docMk/>
+            <pc:sldMk cId="1090978945" sldId="260"/>
+            <ac:picMk id="5" creationId="{940C61CD-DDE2-2271-BA07-1B63DBF64558}"/>
+          </ac:picMkLst>
+        </pc:picChg>
+      </pc:sldChg>
+      <pc:sldChg chg="modSp mod">
+        <pc:chgData name="Rebecca Ngooi" userId="1f97d8b7894e3c19" providerId="LiveId" clId="{E919E623-3C73-48DF-8900-CCE3CBBED04B}" dt="2023-07-10T12:06:16.028" v="651" actId="113"/>
+        <pc:sldMkLst>
+          <pc:docMk/>
+          <pc:sldMk cId="3910133755" sldId="261"/>
+        </pc:sldMkLst>
+        <pc:spChg chg="mod">
+          <ac:chgData name="Rebecca Ngooi" userId="1f97d8b7894e3c19" providerId="LiveId" clId="{E919E623-3C73-48DF-8900-CCE3CBBED04B}" dt="2023-07-10T12:06:16.028" v="651" actId="113"/>
+          <ac:spMkLst>
+            <pc:docMk/>
+            <pc:sldMk cId="3910133755" sldId="261"/>
+            <ac:spMk id="2" creationId="{FDC7C65B-1982-3A22-9C57-51CF538B98B0}"/>
+          </ac:spMkLst>
+        </pc:spChg>
+        <pc:spChg chg="mod">
+          <ac:chgData name="Rebecca Ngooi" userId="1f97d8b7894e3c19" providerId="LiveId" clId="{E919E623-3C73-48DF-8900-CCE3CBBED04B}" dt="2023-07-10T12:01:44.680" v="422" actId="6549"/>
+          <ac:spMkLst>
+            <pc:docMk/>
+            <pc:sldMk cId="3910133755" sldId="261"/>
+            <ac:spMk id="3" creationId="{A215F8CC-8C6A-CDFE-1234-E27D2491B504}"/>
+          </ac:spMkLst>
+        </pc:spChg>
+      </pc:sldChg>
+      <pc:sldChg chg="addSp delSp modSp del mod">
+        <pc:chgData name="Rebecca Ngooi" userId="1f97d8b7894e3c19" providerId="LiveId" clId="{E919E623-3C73-48DF-8900-CCE3CBBED04B}" dt="2023-07-10T11:41:46.812" v="17" actId="2696"/>
+        <pc:sldMkLst>
+          <pc:docMk/>
+          <pc:sldMk cId="3079774500" sldId="263"/>
+        </pc:sldMkLst>
+        <pc:picChg chg="add mod modCrop">
+          <ac:chgData name="Rebecca Ngooi" userId="1f97d8b7894e3c19" providerId="LiveId" clId="{E919E623-3C73-48DF-8900-CCE3CBBED04B}" dt="2023-07-10T11:41:17.772" v="9" actId="1076"/>
+          <ac:picMkLst>
+            <pc:docMk/>
+            <pc:sldMk cId="3079774500" sldId="263"/>
+            <ac:picMk id="3" creationId="{6DB532E0-954F-E1F7-38F0-10B8F4668F57}"/>
+          </ac:picMkLst>
+        </pc:picChg>
+        <pc:picChg chg="del">
+          <ac:chgData name="Rebecca Ngooi" userId="1f97d8b7894e3c19" providerId="LiveId" clId="{E919E623-3C73-48DF-8900-CCE3CBBED04B}" dt="2023-07-10T11:39:32.398" v="0" actId="478"/>
+          <ac:picMkLst>
+            <pc:docMk/>
+            <pc:sldMk cId="3079774500" sldId="263"/>
+            <ac:picMk id="5" creationId="{0DCA503E-1755-A2EA-C3A7-B51C919B11BB}"/>
+          </ac:picMkLst>
+        </pc:picChg>
+      </pc:sldChg>
+      <pc:sldChg chg="del">
+        <pc:chgData name="Rebecca Ngooi" userId="1f97d8b7894e3c19" providerId="LiveId" clId="{E919E623-3C73-48DF-8900-CCE3CBBED04B}" dt="2023-07-10T11:46:01.282" v="33" actId="2696"/>
+        <pc:sldMkLst>
+          <pc:docMk/>
+          <pc:sldMk cId="1812677092" sldId="265"/>
+        </pc:sldMkLst>
+      </pc:sldChg>
+      <pc:sldChg chg="modSp mod">
+        <pc:chgData name="Rebecca Ngooi" userId="1f97d8b7894e3c19" providerId="LiveId" clId="{E919E623-3C73-48DF-8900-CCE3CBBED04B}" dt="2023-07-10T12:09:05.750" v="698" actId="20577"/>
+        <pc:sldMkLst>
+          <pc:docMk/>
+          <pc:sldMk cId="1646783546" sldId="267"/>
+        </pc:sldMkLst>
+        <pc:spChg chg="mod">
+          <ac:chgData name="Rebecca Ngooi" userId="1f97d8b7894e3c19" providerId="LiveId" clId="{E919E623-3C73-48DF-8900-CCE3CBBED04B}" dt="2023-07-10T12:06:19.239" v="652" actId="113"/>
+          <ac:spMkLst>
+            <pc:docMk/>
+            <pc:sldMk cId="1646783546" sldId="267"/>
+            <ac:spMk id="2" creationId="{FDC7C65B-1982-3A22-9C57-51CF538B98B0}"/>
+          </ac:spMkLst>
+        </pc:spChg>
+        <pc:spChg chg="mod">
+          <ac:chgData name="Rebecca Ngooi" userId="1f97d8b7894e3c19" providerId="LiveId" clId="{E919E623-3C73-48DF-8900-CCE3CBBED04B}" dt="2023-07-10T12:09:05.750" v="698" actId="20577"/>
+          <ac:spMkLst>
+            <pc:docMk/>
+            <pc:sldMk cId="1646783546" sldId="267"/>
+            <ac:spMk id="3" creationId="{A215F8CC-8C6A-CDFE-1234-E27D2491B504}"/>
+          </ac:spMkLst>
+        </pc:spChg>
+      </pc:sldChg>
+      <pc:sldChg chg="addSp delSp modSp mod ord">
+        <pc:chgData name="Rebecca Ngooi" userId="1f97d8b7894e3c19" providerId="LiveId" clId="{E919E623-3C73-48DF-8900-CCE3CBBED04B}" dt="2023-07-10T11:57:09.655" v="346" actId="1076"/>
+        <pc:sldMkLst>
+          <pc:docMk/>
+          <pc:sldMk cId="2492437374" sldId="268"/>
+        </pc:sldMkLst>
+        <pc:picChg chg="add mod">
+          <ac:chgData name="Rebecca Ngooi" userId="1f97d8b7894e3c19" providerId="LiveId" clId="{E919E623-3C73-48DF-8900-CCE3CBBED04B}" dt="2023-07-10T11:57:09.655" v="346" actId="1076"/>
+          <ac:picMkLst>
+            <pc:docMk/>
+            <pc:sldMk cId="2492437374" sldId="268"/>
+            <ac:picMk id="3" creationId="{7EC99200-5C54-1AF6-5766-2F1284470012}"/>
+          </ac:picMkLst>
+        </pc:picChg>
+        <pc:picChg chg="del">
+          <ac:chgData name="Rebecca Ngooi" userId="1f97d8b7894e3c19" providerId="LiveId" clId="{E919E623-3C73-48DF-8900-CCE3CBBED04B}" dt="2023-07-10T11:41:33.286" v="12" actId="478"/>
+          <ac:picMkLst>
+            <pc:docMk/>
+            <pc:sldMk cId="2492437374" sldId="268"/>
+            <ac:picMk id="8" creationId="{C2ED5844-EB9D-EEDE-EC6F-E8C5F310FBF2}"/>
+          </ac:picMkLst>
+        </pc:picChg>
+      </pc:sldChg>
+      <pc:sldChg chg="modSp mod">
+        <pc:chgData name="Rebecca Ngooi" userId="1f97d8b7894e3c19" providerId="LiveId" clId="{E919E623-3C73-48DF-8900-CCE3CBBED04B}" dt="2023-07-10T12:06:44.639" v="663" actId="20577"/>
+        <pc:sldMkLst>
+          <pc:docMk/>
+          <pc:sldMk cId="3969244429" sldId="269"/>
+        </pc:sldMkLst>
+        <pc:spChg chg="mod">
+          <ac:chgData name="Rebecca Ngooi" userId="1f97d8b7894e3c19" providerId="LiveId" clId="{E919E623-3C73-48DF-8900-CCE3CBBED04B}" dt="2023-07-10T12:06:44.639" v="663" actId="20577"/>
+          <ac:spMkLst>
+            <pc:docMk/>
+            <pc:sldMk cId="3969244429" sldId="269"/>
+            <ac:spMk id="2" creationId="{22BA3E6E-F8AC-D39D-513A-4F8FF3330F89}"/>
+          </ac:spMkLst>
+        </pc:spChg>
+        <pc:picChg chg="mod">
+          <ac:chgData name="Rebecca Ngooi" userId="1f97d8b7894e3c19" providerId="LiveId" clId="{E919E623-3C73-48DF-8900-CCE3CBBED04B}" dt="2023-07-10T11:42:08.523" v="20" actId="1076"/>
+          <ac:picMkLst>
+            <pc:docMk/>
+            <pc:sldMk cId="3969244429" sldId="269"/>
+            <ac:picMk id="4" creationId="{67A94DD5-2D61-5B83-5ED4-F092E0967DFE}"/>
+          </ac:picMkLst>
+        </pc:picChg>
+      </pc:sldChg>
+      <pc:sldChg chg="modSp add del mod">
+        <pc:chgData name="Rebecca Ngooi" userId="1f97d8b7894e3c19" providerId="LiveId" clId="{E919E623-3C73-48DF-8900-CCE3CBBED04B}" dt="2023-07-10T11:59:08.114" v="375" actId="2696"/>
+        <pc:sldMkLst>
+          <pc:docMk/>
+          <pc:sldMk cId="1838429803" sldId="270"/>
+        </pc:sldMkLst>
+        <pc:spChg chg="mod">
+          <ac:chgData name="Rebecca Ngooi" userId="1f97d8b7894e3c19" providerId="LiveId" clId="{E919E623-3C73-48DF-8900-CCE3CBBED04B}" dt="2023-07-10T11:45:52.610" v="31"/>
+          <ac:spMkLst>
+            <pc:docMk/>
+            <pc:sldMk cId="1838429803" sldId="270"/>
+            <ac:spMk id="2" creationId="{5088FF0C-BE12-1258-DEFF-7AB3E7FE7487}"/>
+          </ac:spMkLst>
+        </pc:spChg>
+        <pc:spChg chg="mod">
+          <ac:chgData name="Rebecca Ngooi" userId="1f97d8b7894e3c19" providerId="LiveId" clId="{E919E623-3C73-48DF-8900-CCE3CBBED04B}" dt="2023-07-10T11:53:11.201" v="267" actId="20577"/>
+          <ac:spMkLst>
+            <pc:docMk/>
+            <pc:sldMk cId="1838429803" sldId="270"/>
+            <ac:spMk id="3" creationId="{E57B7165-57F4-26B5-B164-4914825A3BE8}"/>
+          </ac:spMkLst>
+        </pc:spChg>
+      </pc:sldChg>
+      <pc:sldChg chg="modSp add mod">
+        <pc:chgData name="Rebecca Ngooi" userId="1f97d8b7894e3c19" providerId="LiveId" clId="{E919E623-3C73-48DF-8900-CCE3CBBED04B}" dt="2023-07-10T12:31:23.975" v="829" actId="11"/>
+        <pc:sldMkLst>
+          <pc:docMk/>
+          <pc:sldMk cId="88934229" sldId="271"/>
+        </pc:sldMkLst>
+        <pc:spChg chg="mod">
+          <ac:chgData name="Rebecca Ngooi" userId="1f97d8b7894e3c19" providerId="LiveId" clId="{E919E623-3C73-48DF-8900-CCE3CBBED04B}" dt="2023-07-10T12:06:35.211" v="658" actId="20577"/>
+          <ac:spMkLst>
+            <pc:docMk/>
+            <pc:sldMk cId="88934229" sldId="271"/>
+            <ac:spMk id="2" creationId="{5088FF0C-BE12-1258-DEFF-7AB3E7FE7487}"/>
+          </ac:spMkLst>
+        </pc:spChg>
+        <pc:spChg chg="mod">
+          <ac:chgData name="Rebecca Ngooi" userId="1f97d8b7894e3c19" providerId="LiveId" clId="{E919E623-3C73-48DF-8900-CCE3CBBED04B}" dt="2023-07-10T12:31:23.975" v="829" actId="11"/>
+          <ac:spMkLst>
+            <pc:docMk/>
+            <pc:sldMk cId="88934229" sldId="271"/>
+            <ac:spMk id="3" creationId="{E57B7165-57F4-26B5-B164-4914825A3BE8}"/>
+          </ac:spMkLst>
+        </pc:spChg>
+      </pc:sldChg>
+    </pc:docChg>
+  </pc:docChgLst>
+</pc:chgInfo>
 </file>
 
 <file path=ppt/slideLayouts/slideLayout1.xml><?xml version="1.0" encoding="utf-8"?>
@@ -272,7 +537,7 @@
           <a:p>
             <a:fld id="{0EF8CBEE-E409-4F16-B899-81EF32BBC7D7}" type="datetimeFigureOut">
               <a:rPr lang="en-AU" smtClean="0"/>
-              <a:t>8/07/2023</a:t>
+              <a:t>10/07/2023</a:t>
             </a:fld>
             <a:endParaRPr lang="en-AU"/>
           </a:p>
@@ -472,7 +737,7 @@
           <a:p>
             <a:fld id="{0EF8CBEE-E409-4F16-B899-81EF32BBC7D7}" type="datetimeFigureOut">
               <a:rPr lang="en-AU" smtClean="0"/>
-              <a:t>8/07/2023</a:t>
+              <a:t>10/07/2023</a:t>
             </a:fld>
             <a:endParaRPr lang="en-AU"/>
           </a:p>
@@ -682,7 +947,7 @@
           <a:p>
             <a:fld id="{0EF8CBEE-E409-4F16-B899-81EF32BBC7D7}" type="datetimeFigureOut">
               <a:rPr lang="en-AU" smtClean="0"/>
-              <a:t>8/07/2023</a:t>
+              <a:t>10/07/2023</a:t>
             </a:fld>
             <a:endParaRPr lang="en-AU"/>
           </a:p>
@@ -882,7 +1147,7 @@
           <a:p>
             <a:fld id="{0EF8CBEE-E409-4F16-B899-81EF32BBC7D7}" type="datetimeFigureOut">
               <a:rPr lang="en-AU" smtClean="0"/>
-              <a:t>8/07/2023</a:t>
+              <a:t>10/07/2023</a:t>
             </a:fld>
             <a:endParaRPr lang="en-AU"/>
           </a:p>
@@ -1158,7 +1423,7 @@
           <a:p>
             <a:fld id="{0EF8CBEE-E409-4F16-B899-81EF32BBC7D7}" type="datetimeFigureOut">
               <a:rPr lang="en-AU" smtClean="0"/>
-              <a:t>8/07/2023</a:t>
+              <a:t>10/07/2023</a:t>
             </a:fld>
             <a:endParaRPr lang="en-AU"/>
           </a:p>
@@ -1426,7 +1691,7 @@
           <a:p>
             <a:fld id="{0EF8CBEE-E409-4F16-B899-81EF32BBC7D7}" type="datetimeFigureOut">
               <a:rPr lang="en-AU" smtClean="0"/>
-              <a:t>8/07/2023</a:t>
+              <a:t>10/07/2023</a:t>
             </a:fld>
             <a:endParaRPr lang="en-AU"/>
           </a:p>
@@ -1841,7 +2106,7 @@
           <a:p>
             <a:fld id="{0EF8CBEE-E409-4F16-B899-81EF32BBC7D7}" type="datetimeFigureOut">
               <a:rPr lang="en-AU" smtClean="0"/>
-              <a:t>8/07/2023</a:t>
+              <a:t>10/07/2023</a:t>
             </a:fld>
             <a:endParaRPr lang="en-AU"/>
           </a:p>
@@ -1983,7 +2248,7 @@
           <a:p>
             <a:fld id="{0EF8CBEE-E409-4F16-B899-81EF32BBC7D7}" type="datetimeFigureOut">
               <a:rPr lang="en-AU" smtClean="0"/>
-              <a:t>8/07/2023</a:t>
+              <a:t>10/07/2023</a:t>
             </a:fld>
             <a:endParaRPr lang="en-AU"/>
           </a:p>
@@ -2096,7 +2361,7 @@
           <a:p>
             <a:fld id="{0EF8CBEE-E409-4F16-B899-81EF32BBC7D7}" type="datetimeFigureOut">
               <a:rPr lang="en-AU" smtClean="0"/>
-              <a:t>8/07/2023</a:t>
+              <a:t>10/07/2023</a:t>
             </a:fld>
             <a:endParaRPr lang="en-AU"/>
           </a:p>
@@ -2409,7 +2674,7 @@
           <a:p>
             <a:fld id="{0EF8CBEE-E409-4F16-B899-81EF32BBC7D7}" type="datetimeFigureOut">
               <a:rPr lang="en-AU" smtClean="0"/>
-              <a:t>8/07/2023</a:t>
+              <a:t>10/07/2023</a:t>
             </a:fld>
             <a:endParaRPr lang="en-AU"/>
           </a:p>
@@ -2698,7 +2963,7 @@
           <a:p>
             <a:fld id="{0EF8CBEE-E409-4F16-B899-81EF32BBC7D7}" type="datetimeFigureOut">
               <a:rPr lang="en-AU" smtClean="0"/>
-              <a:t>8/07/2023</a:t>
+              <a:t>10/07/2023</a:t>
             </a:fld>
             <a:endParaRPr lang="en-AU"/>
           </a:p>
@@ -2941,7 +3206,7 @@
           <a:p>
             <a:fld id="{0EF8CBEE-E409-4F16-B899-81EF32BBC7D7}" type="datetimeFigureOut">
               <a:rPr lang="en-AU" smtClean="0"/>
-              <a:t>8/07/2023</a:t>
+              <a:t>10/07/2023</a:t>
             </a:fld>
             <a:endParaRPr lang="en-AU"/>
           </a:p>
@@ -15812,7 +16077,7 @@
         </p:nvSpPr>
         <p:spPr>
           <a:xfrm>
-            <a:off x="233679" y="264160"/>
+            <a:off x="188439" y="1609881"/>
             <a:ext cx="3320403" cy="3046988"/>
           </a:xfrm>
           <a:prstGeom prst="rect">
@@ -15828,7 +16093,7 @@
           <a:p>
             <a:pPr algn="ctr"/>
             <a:r>
-              <a:rPr lang="en-AU" sz="4800" dirty="0">
+              <a:rPr lang="en-AU" sz="4800" b="1" dirty="0">
                 <a:solidFill>
                   <a:schemeClr val="bg1"/>
                 </a:solidFill>
@@ -15839,7 +16104,7 @@
           <a:p>
             <a:pPr algn="ctr"/>
             <a:r>
-              <a:rPr lang="en-AU" sz="4800" dirty="0">
+              <a:rPr lang="en-AU" sz="4800" b="1" dirty="0">
                 <a:solidFill>
                   <a:schemeClr val="bg1"/>
                 </a:solidFill>
@@ -15935,526 +16200,6 @@
 </file>
 
 <file path=ppt/slides/slide10.xml><?xml version="1.0" encoding="utf-8"?>
-<p:sld xmlns:a="http://schemas.openxmlformats.org/drawingml/2006/main" xmlns:r="http://schemas.openxmlformats.org/officeDocument/2006/relationships" xmlns:p="http://schemas.openxmlformats.org/presentationml/2006/main">
-  <p:cSld>
-    <p:bg>
-      <p:bgPr>
-        <a:solidFill>
-          <a:schemeClr val="bg1"/>
-        </a:solidFill>
-        <a:effectLst/>
-      </p:bgPr>
-    </p:bg>
-    <p:spTree>
-      <p:nvGrpSpPr>
-        <p:cNvPr id="1" name=""/>
-        <p:cNvGrpSpPr/>
-        <p:nvPr/>
-      </p:nvGrpSpPr>
-      <p:grpSpPr>
-        <a:xfrm>
-          <a:off x="0" y="0"/>
-          <a:ext cx="0" cy="0"/>
-          <a:chOff x="0" y="0"/>
-          <a:chExt cx="0" cy="0"/>
-        </a:xfrm>
-      </p:grpSpPr>
-      <p:sp useBgFill="1">
-        <p:nvSpPr>
-          <p:cNvPr id="9" name="Rectangle 8">
-            <a:extLst>
-              <a:ext uri="{FF2B5EF4-FFF2-40B4-BE49-F238E27FC236}">
-                <a16:creationId xmlns:a16="http://schemas.microsoft.com/office/drawing/2014/main" id="{BCED4D40-4B67-4331-AC48-79B82B4A47D8}"/>
-              </a:ext>
-              <a:ext uri="{C183D7F6-B498-43B3-948B-1728B52AA6E4}">
-                <adec:decorative xmlns:adec="http://schemas.microsoft.com/office/drawing/2017/decorative" val="1"/>
-              </a:ext>
-            </a:extLst>
-          </p:cNvPr>
-          <p:cNvSpPr>
-            <a:spLocks noGrp="1" noRot="1" noChangeAspect="1" noMove="1" noResize="1" noEditPoints="1" noAdjustHandles="1" noChangeArrowheads="1" noChangeShapeType="1" noTextEdit="1"/>
-          </p:cNvSpPr>
-          <p:nvPr>
-            <p:extLst>
-              <p:ext uri="{386F3935-93C4-4BCD-93E2-E3B085C9AB24}">
-                <p16:designElem xmlns:p16="http://schemas.microsoft.com/office/powerpoint/2015/main" val="1"/>
-              </p:ext>
-            </p:extLst>
-          </p:nvPr>
-        </p:nvSpPr>
-        <p:spPr>
-          <a:xfrm>
-            <a:off x="0" y="0"/>
-            <a:ext cx="12192000" cy="6858000"/>
-          </a:xfrm>
-          <a:prstGeom prst="rect">
-            <a:avLst/>
-          </a:prstGeom>
-          <a:ln>
-            <a:noFill/>
-          </a:ln>
-        </p:spPr>
-        <p:style>
-          <a:lnRef idx="2">
-            <a:schemeClr val="accent1">
-              <a:shade val="50000"/>
-            </a:schemeClr>
-          </a:lnRef>
-          <a:fillRef idx="1">
-            <a:schemeClr val="accent1"/>
-          </a:fillRef>
-          <a:effectRef idx="0">
-            <a:schemeClr val="accent1"/>
-          </a:effectRef>
-          <a:fontRef idx="minor">
-            <a:schemeClr val="lt1"/>
-          </a:fontRef>
-        </p:style>
-        <p:txBody>
-          <a:bodyPr rtlCol="0" anchor="ctr"/>
-          <a:lstStyle/>
-          <a:p>
-            <a:pPr algn="ctr"/>
-            <a:endParaRPr lang="en-US"/>
-          </a:p>
-        </p:txBody>
-      </p:sp>
-      <p:sp>
-        <p:nvSpPr>
-          <p:cNvPr id="2" name="Title 1">
-            <a:extLst>
-              <a:ext uri="{FF2B5EF4-FFF2-40B4-BE49-F238E27FC236}">
-                <a16:creationId xmlns:a16="http://schemas.microsoft.com/office/drawing/2014/main" id="{22BA3E6E-F8AC-D39D-513A-4F8FF3330F89}"/>
-              </a:ext>
-            </a:extLst>
-          </p:cNvPr>
-          <p:cNvSpPr>
-            <a:spLocks noGrp="1"/>
-          </p:cNvSpPr>
-          <p:nvPr>
-            <p:ph type="title"/>
-          </p:nvPr>
-        </p:nvSpPr>
-        <p:spPr>
-          <a:xfrm>
-            <a:off x="638881" y="417576"/>
-            <a:ext cx="10909640" cy="1249394"/>
-          </a:xfrm>
-        </p:spPr>
-        <p:txBody>
-          <a:bodyPr vert="horz" lIns="91440" tIns="45720" rIns="91440" bIns="45720" rtlCol="0" anchor="ctr">
-            <a:normAutofit fontScale="90000"/>
-          </a:bodyPr>
-          <a:lstStyle/>
-          <a:p>
-            <a:pPr algn="ctr"/>
-            <a:r>
-              <a:rPr lang="en-US" sz="6600" kern="1200" dirty="0">
-                <a:solidFill>
-                  <a:schemeClr val="tx1"/>
-                </a:solidFill>
-                <a:latin typeface="+mj-lt"/>
-                <a:ea typeface="+mj-ea"/>
-                <a:cs typeface="+mj-cs"/>
-              </a:rPr>
-              <a:t>Top 10 countries by cumulative cases</a:t>
-            </a:r>
-          </a:p>
-        </p:txBody>
-      </p:sp>
-      <p:sp>
-        <p:nvSpPr>
-          <p:cNvPr id="11" name="sketch line">
-            <a:extLst>
-              <a:ext uri="{FF2B5EF4-FFF2-40B4-BE49-F238E27FC236}">
-                <a16:creationId xmlns:a16="http://schemas.microsoft.com/office/drawing/2014/main" id="{670CEDEF-4F34-412E-84EE-329C1E936AF5}"/>
-              </a:ext>
-              <a:ext uri="{C183D7F6-B498-43B3-948B-1728B52AA6E4}">
-                <adec:decorative xmlns:adec="http://schemas.microsoft.com/office/drawing/2017/decorative" val="1"/>
-              </a:ext>
-            </a:extLst>
-          </p:cNvPr>
-          <p:cNvSpPr>
-            <a:spLocks noGrp="1" noRot="1" noChangeAspect="1" noMove="1" noResize="1" noEditPoints="1" noAdjustHandles="1" noChangeArrowheads="1" noChangeShapeType="1" noTextEdit="1"/>
-          </p:cNvSpPr>
-          <p:nvPr>
-            <p:extLst>
-              <p:ext uri="{386F3935-93C4-4BCD-93E2-E3B085C9AB24}">
-                <p16:designElem xmlns:p16="http://schemas.microsoft.com/office/powerpoint/2015/main" val="1"/>
-              </p:ext>
-            </p:extLst>
-          </p:nvPr>
-        </p:nvSpPr>
-        <p:spPr>
-          <a:xfrm>
-            <a:off x="3807702" y="1733454"/>
-            <a:ext cx="4572000" cy="18288"/>
-          </a:xfrm>
-          <a:custGeom>
-            <a:avLst/>
-            <a:gdLst>
-              <a:gd name="connsiteX0" fmla="*/ 0 w 4572000"/>
-              <a:gd name="connsiteY0" fmla="*/ 0 h 18288"/>
-              <a:gd name="connsiteX1" fmla="*/ 515983 w 4572000"/>
-              <a:gd name="connsiteY1" fmla="*/ 0 h 18288"/>
-              <a:gd name="connsiteX2" fmla="*/ 1031966 w 4572000"/>
-              <a:gd name="connsiteY2" fmla="*/ 0 h 18288"/>
-              <a:gd name="connsiteX3" fmla="*/ 1639389 w 4572000"/>
-              <a:gd name="connsiteY3" fmla="*/ 0 h 18288"/>
-              <a:gd name="connsiteX4" fmla="*/ 2383971 w 4572000"/>
-              <a:gd name="connsiteY4" fmla="*/ 0 h 18288"/>
-              <a:gd name="connsiteX5" fmla="*/ 2945674 w 4572000"/>
-              <a:gd name="connsiteY5" fmla="*/ 0 h 18288"/>
-              <a:gd name="connsiteX6" fmla="*/ 3507377 w 4572000"/>
-              <a:gd name="connsiteY6" fmla="*/ 0 h 18288"/>
-              <a:gd name="connsiteX7" fmla="*/ 4572000 w 4572000"/>
-              <a:gd name="connsiteY7" fmla="*/ 0 h 18288"/>
-              <a:gd name="connsiteX8" fmla="*/ 4572000 w 4572000"/>
-              <a:gd name="connsiteY8" fmla="*/ 18288 h 18288"/>
-              <a:gd name="connsiteX9" fmla="*/ 3873137 w 4572000"/>
-              <a:gd name="connsiteY9" fmla="*/ 18288 h 18288"/>
-              <a:gd name="connsiteX10" fmla="*/ 3311434 w 4572000"/>
-              <a:gd name="connsiteY10" fmla="*/ 18288 h 18288"/>
-              <a:gd name="connsiteX11" fmla="*/ 2749731 w 4572000"/>
-              <a:gd name="connsiteY11" fmla="*/ 18288 h 18288"/>
-              <a:gd name="connsiteX12" fmla="*/ 2050869 w 4572000"/>
-              <a:gd name="connsiteY12" fmla="*/ 18288 h 18288"/>
-              <a:gd name="connsiteX13" fmla="*/ 1306286 w 4572000"/>
-              <a:gd name="connsiteY13" fmla="*/ 18288 h 18288"/>
-              <a:gd name="connsiteX14" fmla="*/ 790303 w 4572000"/>
-              <a:gd name="connsiteY14" fmla="*/ 18288 h 18288"/>
-              <a:gd name="connsiteX15" fmla="*/ 0 w 4572000"/>
-              <a:gd name="connsiteY15" fmla="*/ 18288 h 18288"/>
-              <a:gd name="connsiteX16" fmla="*/ 0 w 4572000"/>
-              <a:gd name="connsiteY16" fmla="*/ 0 h 18288"/>
-            </a:gdLst>
-            <a:ahLst/>
-            <a:cxnLst>
-              <a:cxn ang="0">
-                <a:pos x="connsiteX0" y="connsiteY0"/>
-              </a:cxn>
-              <a:cxn ang="0">
-                <a:pos x="connsiteX1" y="connsiteY1"/>
-              </a:cxn>
-              <a:cxn ang="0">
-                <a:pos x="connsiteX2" y="connsiteY2"/>
-              </a:cxn>
-              <a:cxn ang="0">
-                <a:pos x="connsiteX3" y="connsiteY3"/>
-              </a:cxn>
-              <a:cxn ang="0">
-                <a:pos x="connsiteX4" y="connsiteY4"/>
-              </a:cxn>
-              <a:cxn ang="0">
-                <a:pos x="connsiteX5" y="connsiteY5"/>
-              </a:cxn>
-              <a:cxn ang="0">
-                <a:pos x="connsiteX6" y="connsiteY6"/>
-              </a:cxn>
-              <a:cxn ang="0">
-                <a:pos x="connsiteX7" y="connsiteY7"/>
-              </a:cxn>
-              <a:cxn ang="0">
-                <a:pos x="connsiteX8" y="connsiteY8"/>
-              </a:cxn>
-              <a:cxn ang="0">
-                <a:pos x="connsiteX9" y="connsiteY9"/>
-              </a:cxn>
-              <a:cxn ang="0">
-                <a:pos x="connsiteX10" y="connsiteY10"/>
-              </a:cxn>
-              <a:cxn ang="0">
-                <a:pos x="connsiteX11" y="connsiteY11"/>
-              </a:cxn>
-              <a:cxn ang="0">
-                <a:pos x="connsiteX12" y="connsiteY12"/>
-              </a:cxn>
-              <a:cxn ang="0">
-                <a:pos x="connsiteX13" y="connsiteY13"/>
-              </a:cxn>
-              <a:cxn ang="0">
-                <a:pos x="connsiteX14" y="connsiteY14"/>
-              </a:cxn>
-              <a:cxn ang="0">
-                <a:pos x="connsiteX15" y="connsiteY15"/>
-              </a:cxn>
-              <a:cxn ang="0">
-                <a:pos x="connsiteX16" y="connsiteY16"/>
-              </a:cxn>
-            </a:cxnLst>
-            <a:rect l="l" t="t" r="r" b="b"/>
-            <a:pathLst>
-              <a:path w="4572000" h="18288" fill="none" extrusionOk="0">
-                <a:moveTo>
-                  <a:pt x="0" y="0"/>
-                </a:moveTo>
-                <a:cubicBezTo>
-                  <a:pt x="105156" y="-20963"/>
-                  <a:pt x="340432" y="822"/>
-                  <a:pt x="515983" y="0"/>
-                </a:cubicBezTo>
-                <a:cubicBezTo>
-                  <a:pt x="691534" y="-822"/>
-                  <a:pt x="850679" y="16479"/>
-                  <a:pt x="1031966" y="0"/>
-                </a:cubicBezTo>
-                <a:cubicBezTo>
-                  <a:pt x="1213253" y="-16479"/>
-                  <a:pt x="1443646" y="-18730"/>
-                  <a:pt x="1639389" y="0"/>
-                </a:cubicBezTo>
-                <a:cubicBezTo>
-                  <a:pt x="1835132" y="18730"/>
-                  <a:pt x="2159975" y="18531"/>
-                  <a:pt x="2383971" y="0"/>
-                </a:cubicBezTo>
-                <a:cubicBezTo>
-                  <a:pt x="2607967" y="-18531"/>
-                  <a:pt x="2719096" y="-12030"/>
-                  <a:pt x="2945674" y="0"/>
-                </a:cubicBezTo>
-                <a:cubicBezTo>
-                  <a:pt x="3172252" y="12030"/>
-                  <a:pt x="3269167" y="27666"/>
-                  <a:pt x="3507377" y="0"/>
-                </a:cubicBezTo>
-                <a:cubicBezTo>
-                  <a:pt x="3745587" y="-27666"/>
-                  <a:pt x="4116741" y="18705"/>
-                  <a:pt x="4572000" y="0"/>
-                </a:cubicBezTo>
-                <a:cubicBezTo>
-                  <a:pt x="4572895" y="8974"/>
-                  <a:pt x="4571454" y="9359"/>
-                  <a:pt x="4572000" y="18288"/>
-                </a:cubicBezTo>
-                <a:cubicBezTo>
-                  <a:pt x="4374698" y="3942"/>
-                  <a:pt x="4098874" y="-11042"/>
-                  <a:pt x="3873137" y="18288"/>
-                </a:cubicBezTo>
-                <a:cubicBezTo>
-                  <a:pt x="3647400" y="47618"/>
-                  <a:pt x="3517055" y="5421"/>
-                  <a:pt x="3311434" y="18288"/>
-                </a:cubicBezTo>
-                <a:cubicBezTo>
-                  <a:pt x="3105813" y="31155"/>
-                  <a:pt x="3025168" y="17856"/>
-                  <a:pt x="2749731" y="18288"/>
-                </a:cubicBezTo>
-                <a:cubicBezTo>
-                  <a:pt x="2474294" y="18720"/>
-                  <a:pt x="2291766" y="-14168"/>
-                  <a:pt x="2050869" y="18288"/>
-                </a:cubicBezTo>
-                <a:cubicBezTo>
-                  <a:pt x="1809972" y="50744"/>
-                  <a:pt x="1540276" y="46798"/>
-                  <a:pt x="1306286" y="18288"/>
-                </a:cubicBezTo>
-                <a:cubicBezTo>
-                  <a:pt x="1072296" y="-10222"/>
-                  <a:pt x="972445" y="19645"/>
-                  <a:pt x="790303" y="18288"/>
-                </a:cubicBezTo>
-                <a:cubicBezTo>
-                  <a:pt x="608161" y="16931"/>
-                  <a:pt x="200981" y="8241"/>
-                  <a:pt x="0" y="18288"/>
-                </a:cubicBezTo>
-                <a:cubicBezTo>
-                  <a:pt x="-229" y="14222"/>
-                  <a:pt x="509" y="5816"/>
-                  <a:pt x="0" y="0"/>
-                </a:cubicBezTo>
-                <a:close/>
-              </a:path>
-              <a:path w="4572000" h="18288" stroke="0" extrusionOk="0">
-                <a:moveTo>
-                  <a:pt x="0" y="0"/>
-                </a:moveTo>
-                <a:cubicBezTo>
-                  <a:pt x="143285" y="-9565"/>
-                  <a:pt x="327959" y="-11498"/>
-                  <a:pt x="561703" y="0"/>
-                </a:cubicBezTo>
-                <a:cubicBezTo>
-                  <a:pt x="795447" y="11498"/>
-                  <a:pt x="838260" y="18255"/>
-                  <a:pt x="1077686" y="0"/>
-                </a:cubicBezTo>
-                <a:cubicBezTo>
-                  <a:pt x="1317112" y="-18255"/>
-                  <a:pt x="1437472" y="23514"/>
-                  <a:pt x="1639389" y="0"/>
-                </a:cubicBezTo>
-                <a:cubicBezTo>
-                  <a:pt x="1841306" y="-23514"/>
-                  <a:pt x="2037142" y="-12551"/>
-                  <a:pt x="2292531" y="0"/>
-                </a:cubicBezTo>
-                <a:cubicBezTo>
-                  <a:pt x="2547920" y="12551"/>
-                  <a:pt x="2810436" y="-20352"/>
-                  <a:pt x="2991394" y="0"/>
-                </a:cubicBezTo>
-                <a:cubicBezTo>
-                  <a:pt x="3172352" y="20352"/>
-                  <a:pt x="3530025" y="-13347"/>
-                  <a:pt x="3735977" y="0"/>
-                </a:cubicBezTo>
-                <a:cubicBezTo>
-                  <a:pt x="3941929" y="13347"/>
-                  <a:pt x="4161497" y="34086"/>
-                  <a:pt x="4572000" y="0"/>
-                </a:cubicBezTo>
-                <a:cubicBezTo>
-                  <a:pt x="4571545" y="6162"/>
-                  <a:pt x="4571903" y="11775"/>
-                  <a:pt x="4572000" y="18288"/>
-                </a:cubicBezTo>
-                <a:cubicBezTo>
-                  <a:pt x="4228040" y="36490"/>
-                  <a:pt x="4199736" y="42557"/>
-                  <a:pt x="3873137" y="18288"/>
-                </a:cubicBezTo>
-                <a:cubicBezTo>
-                  <a:pt x="3546538" y="-5981"/>
-                  <a:pt x="3472124" y="16809"/>
-                  <a:pt x="3128554" y="18288"/>
-                </a:cubicBezTo>
-                <a:cubicBezTo>
-                  <a:pt x="2784984" y="19767"/>
-                  <a:pt x="2735896" y="-17781"/>
-                  <a:pt x="2383971" y="18288"/>
-                </a:cubicBezTo>
-                <a:cubicBezTo>
-                  <a:pt x="2032046" y="54357"/>
-                  <a:pt x="2019324" y="2920"/>
-                  <a:pt x="1867989" y="18288"/>
-                </a:cubicBezTo>
-                <a:cubicBezTo>
-                  <a:pt x="1716654" y="33656"/>
-                  <a:pt x="1418675" y="32575"/>
-                  <a:pt x="1169126" y="18288"/>
-                </a:cubicBezTo>
-                <a:cubicBezTo>
-                  <a:pt x="919577" y="4001"/>
-                  <a:pt x="798537" y="16165"/>
-                  <a:pt x="561703" y="18288"/>
-                </a:cubicBezTo>
-                <a:cubicBezTo>
-                  <a:pt x="324869" y="20411"/>
-                  <a:pt x="221395" y="-912"/>
-                  <a:pt x="0" y="18288"/>
-                </a:cubicBezTo>
-                <a:cubicBezTo>
-                  <a:pt x="766" y="10800"/>
-                  <a:pt x="-457" y="8180"/>
-                  <a:pt x="0" y="0"/>
-                </a:cubicBezTo>
-                <a:close/>
-              </a:path>
-            </a:pathLst>
-          </a:custGeom>
-          <a:solidFill>
-            <a:schemeClr val="accent2"/>
-          </a:solidFill>
-          <a:ln w="41275" cap="rnd">
-            <a:solidFill>
-              <a:schemeClr val="accent2"/>
-            </a:solidFill>
-            <a:round/>
-            <a:extLst>
-              <a:ext uri="{C807C97D-BFC1-408E-A445-0C87EB9F89A2}">
-                <ask:lineSketchStyleProps xmlns:ask="http://schemas.microsoft.com/office/drawing/2018/sketchyshapes" sd="2727557108">
-                  <a:prstGeom prst="rect">
-                    <a:avLst/>
-                  </a:prstGeom>
-                  <ask:type>
-                    <ask:lineSketchFreehand/>
-                  </ask:type>
-                </ask:lineSketchStyleProps>
-              </a:ext>
-            </a:extLst>
-          </a:ln>
-        </p:spPr>
-        <p:style>
-          <a:lnRef idx="2">
-            <a:schemeClr val="accent1">
-              <a:shade val="50000"/>
-            </a:schemeClr>
-          </a:lnRef>
-          <a:fillRef idx="1">
-            <a:schemeClr val="accent1"/>
-          </a:fillRef>
-          <a:effectRef idx="0">
-            <a:schemeClr val="accent1"/>
-          </a:effectRef>
-          <a:fontRef idx="minor">
-            <a:schemeClr val="lt1"/>
-          </a:fontRef>
-        </p:style>
-        <p:txBody>
-          <a:bodyPr rtlCol="0" anchor="ctr"/>
-          <a:lstStyle/>
-          <a:p>
-            <a:pPr algn="ctr"/>
-            <a:endParaRPr lang="en-US"/>
-          </a:p>
-        </p:txBody>
-      </p:sp>
-      <p:pic>
-        <p:nvPicPr>
-          <p:cNvPr id="4" name="Picture 3" descr="A graph with blue squares&#10;&#10;Description automatically generated">
-            <a:extLst>
-              <a:ext uri="{FF2B5EF4-FFF2-40B4-BE49-F238E27FC236}">
-                <a16:creationId xmlns:a16="http://schemas.microsoft.com/office/drawing/2014/main" id="{67A94DD5-2D61-5B83-5ED4-F092E0967DFE}"/>
-              </a:ext>
-            </a:extLst>
-          </p:cNvPr>
-          <p:cNvPicPr>
-            <a:picLocks noChangeAspect="1"/>
-          </p:cNvPicPr>
-          <p:nvPr/>
-        </p:nvPicPr>
-        <p:blipFill>
-          <a:blip r:embed="rId2">
-            <a:extLst>
-              <a:ext uri="{28A0092B-C50C-407E-A947-70E740481C1C}">
-                <a14:useLocalDpi xmlns:a14="http://schemas.microsoft.com/office/drawing/2010/main" val="0"/>
-              </a:ext>
-            </a:extLst>
-          </a:blip>
-          <a:stretch>
-            <a:fillRect/>
-          </a:stretch>
-        </p:blipFill>
-        <p:spPr>
-          <a:xfrm>
-            <a:off x="320040" y="3011912"/>
-            <a:ext cx="11548872" cy="2829472"/>
-          </a:xfrm>
-          <a:prstGeom prst="rect">
-            <a:avLst/>
-          </a:prstGeom>
-        </p:spPr>
-      </p:pic>
-    </p:spTree>
-    <p:extLst>
-      <p:ext uri="{BB962C8B-B14F-4D97-AF65-F5344CB8AC3E}">
-        <p14:creationId xmlns:p14="http://schemas.microsoft.com/office/powerpoint/2010/main" val="3969244429"/>
-      </p:ext>
-    </p:extLst>
-  </p:cSld>
-  <p:clrMapOvr>
-    <a:masterClrMapping/>
-  </p:clrMapOvr>
-</p:sld>
-</file>
-
-<file path=ppt/slides/slide11.xml><?xml version="1.0" encoding="utf-8"?>
 <p:sld xmlns:a="http://schemas.openxmlformats.org/drawingml/2006/main" xmlns:r="http://schemas.openxmlformats.org/officeDocument/2006/relationships" xmlns:p="http://schemas.openxmlformats.org/presentationml/2006/main" show="0">
   <p:cSld>
     <p:bg>
@@ -17076,7 +16821,7 @@
 </p:sld>
 </file>
 
-<file path=ppt/slides/slide12.xml><?xml version="1.0" encoding="utf-8"?>
+<file path=ppt/slides/slide11.xml><?xml version="1.0" encoding="utf-8"?>
 <p:sld xmlns:a="http://schemas.openxmlformats.org/drawingml/2006/main" xmlns:r="http://schemas.openxmlformats.org/officeDocument/2006/relationships" xmlns:p="http://schemas.openxmlformats.org/presentationml/2006/main" show="0">
   <p:cSld>
     <p:bg>
@@ -18039,7 +17784,7 @@
           <a:lstStyle/>
           <a:p>
             <a:r>
-              <a:rPr lang="en-US" sz="5400" b="1"/>
+              <a:rPr lang="en-US" sz="5400" b="1" dirty="0"/>
               <a:t>Content</a:t>
             </a:r>
           </a:p>
@@ -18366,12 +18111,12 @@
               <a:buChar char="•"/>
             </a:pPr>
             <a:r>
-              <a:rPr lang="en-US" sz="2200"/>
+              <a:rPr lang="en-US" sz="2200" dirty="0"/>
               <a:t>What is SARS-CoV-2</a:t>
             </a:r>
           </a:p>
           <a:p>
-            <a:pPr marL="571500" indent="-228600">
+            <a:pPr marL="457200" indent="-228600">
               <a:lnSpc>
                 <a:spcPct val="90000"/>
               </a:lnSpc>
@@ -18382,7 +18127,7 @@
               <a:buChar char="•"/>
             </a:pPr>
             <a:r>
-              <a:rPr lang="en-US" sz="2200"/>
+              <a:rPr lang="en-US" sz="2200" dirty="0"/>
               <a:t>Data techniques</a:t>
             </a:r>
           </a:p>
@@ -18398,7 +18143,7 @@
               <a:buChar char="•"/>
             </a:pPr>
             <a:r>
-              <a:rPr lang="en-US" sz="2200"/>
+              <a:rPr lang="en-US" sz="2200" dirty="0"/>
               <a:t>Project implementation</a:t>
             </a:r>
           </a:p>
@@ -18414,7 +18159,7 @@
               <a:buChar char="•"/>
             </a:pPr>
             <a:r>
-              <a:rPr lang="en-US" sz="2200"/>
+              <a:rPr lang="en-US" sz="2200" dirty="0"/>
               <a:t>Project outcome</a:t>
             </a:r>
           </a:p>
@@ -20078,28 +19823,80 @@
           <a:lstStyle/>
           <a:p>
             <a:r>
-              <a:rPr lang="en-AU" sz="2200"/>
+              <a:rPr lang="en-US" sz="2200" b="0" i="0" dirty="0">
+                <a:effectLst/>
+                <a:latin typeface="-apple-system"/>
+              </a:rPr>
+              <a:t>On March 11 2020 the World Health </a:t>
+            </a:r>
+            <a:r>
+              <a:rPr lang="en-US" sz="2200" b="0" i="0" dirty="0" err="1">
+                <a:effectLst/>
+                <a:latin typeface="-apple-system"/>
+              </a:rPr>
+              <a:t>Organisation</a:t>
+            </a:r>
+            <a:r>
+              <a:rPr lang="en-US" sz="2200" b="0" i="0" dirty="0">
+                <a:effectLst/>
+                <a:latin typeface="-apple-system"/>
+              </a:rPr>
+              <a:t> (</a:t>
+            </a:r>
+            <a:r>
+              <a:rPr lang="en-US" sz="2200" b="1" i="0" dirty="0">
+                <a:effectLst/>
+                <a:latin typeface="-apple-system"/>
+              </a:rPr>
+              <a:t>WHO</a:t>
+            </a:r>
+            <a:r>
+              <a:rPr lang="en-US" sz="2200" b="0" i="0" dirty="0">
+                <a:effectLst/>
+                <a:latin typeface="-apple-system"/>
+              </a:rPr>
+              <a:t>) declared the novel coronavirus (COVID-19) a worldwide pandemic. This pandemic declaration for COVID-19 is still active.</a:t>
+            </a:r>
+            <a:endParaRPr lang="en-AU" sz="2200" dirty="0"/>
+          </a:p>
+          <a:p>
+            <a:r>
+              <a:rPr lang="en-AU" sz="2200" dirty="0"/>
               <a:t>February 2020 NSW Health responded to an outbreak of a coronavirus (COVID-2019), first reported in China in December 2019. </a:t>
             </a:r>
           </a:p>
           <a:p>
             <a:r>
-              <a:rPr lang="en-US" sz="2200" b="0" i="0">
+              <a:rPr lang="en-US" sz="2200" b="0" i="0" dirty="0">
                 <a:effectLst/>
                 <a:latin typeface="-apple-system"/>
               </a:rPr>
-              <a:t>On March 11 2020 the World Health Organisation (WHO) declared the novel coronavirus (COVID-19) a worldwide pandemic. This pandemic declaration for COVID-19 is still active.</a:t>
+              <a:t>The project's primary goal is to </a:t>
+            </a:r>
+            <a:r>
+              <a:rPr lang="en-US" sz="2200" b="0" i="0" dirty="0" err="1">
+                <a:effectLst/>
+                <a:latin typeface="-apple-system"/>
+              </a:rPr>
+              <a:t>analyse</a:t>
+            </a:r>
+            <a:r>
+              <a:rPr lang="en-US" sz="2200" b="0" i="0" dirty="0">
+                <a:effectLst/>
+                <a:latin typeface="-apple-system"/>
+              </a:rPr>
+              <a:t> COVID-19 data and gain insights into the cumulative cases and deaths around the world. </a:t>
             </a:r>
           </a:p>
           <a:p>
+            <a:pPr lvl="1"/>
             <a:r>
-              <a:rPr lang="en-US" sz="2200" b="0" i="0">
-                <a:effectLst/>
+              <a:rPr lang="en-US" sz="1800" dirty="0">
                 <a:latin typeface="-apple-system"/>
               </a:rPr>
-              <a:t>The project's primary goal is to analyse COVID-19 data and gain insights into the new and cumulative cases and deaths around the world. Which countries are still hotspots for COVID-19 and which countries have gotten the disease under control. </a:t>
+              <a:t>Objective: Identify the Top 10 countries with cumulative cases and deaths </a:t>
             </a:r>
-            <a:endParaRPr lang="en-AU" sz="2200"/>
+            <a:endParaRPr lang="en-AU" sz="1800" dirty="0"/>
           </a:p>
         </p:txBody>
       </p:sp>
@@ -20230,8 +20027,8 @@
           <a:lstStyle/>
           <a:p>
             <a:r>
-              <a:rPr lang="en-AU" sz="5400" dirty="0"/>
-              <a:t>Project 3</a:t>
+              <a:rPr lang="en-AU" sz="5400" b="1" dirty="0"/>
+              <a:t>Project </a:t>
             </a:r>
           </a:p>
         </p:txBody>
@@ -20547,76 +20344,21 @@
           </a:bodyPr>
           <a:lstStyle/>
           <a:p>
-            <a:pPr algn="l">
-              <a:buFont typeface="+mj-lt"/>
-              <a:buAutoNum type="arabicPeriod"/>
-            </a:pPr>
             <a:r>
-              <a:rPr lang="en-US" b="0" i="0" dirty="0">
-                <a:solidFill>
-                  <a:srgbClr val="2B2B2B"/>
-                </a:solidFill>
-                <a:effectLst/>
-                <a:latin typeface="Roboto" panose="02000000000000000000" pitchFamily="2" charset="0"/>
-              </a:rPr>
-              <a:t>Your </a:t>
+              <a:rPr lang="en-AU" sz="2200" dirty="0"/>
+              <a:t>We created three visualisations, choosing Option 1 using a combination of Leaflet and </a:t>
             </a:r>
             <a:r>
-              <a:rPr lang="en-US" b="0" i="0" dirty="0" err="1">
-                <a:solidFill>
-                  <a:srgbClr val="2B2B2B"/>
-                </a:solidFill>
-                <a:effectLst/>
-                <a:latin typeface="Roboto" panose="02000000000000000000" pitchFamily="2" charset="0"/>
-              </a:rPr>
-              <a:t>visualisation</a:t>
+              <a:rPr lang="en-AU" sz="2200" dirty="0" err="1"/>
+              <a:t>Plotly</a:t>
             </a:r>
-            <a:r>
-              <a:rPr lang="en-US" b="0" i="0" dirty="0">
-                <a:solidFill>
-                  <a:srgbClr val="2B2B2B"/>
-                </a:solidFill>
-                <a:effectLst/>
-                <a:latin typeface="Roboto" panose="02000000000000000000" pitchFamily="2" charset="0"/>
-              </a:rPr>
-              <a:t> must include a Python Flask-powered API, HTML/CSS, JavaScript, and at least one database (SQL, MongoDB, SQLite, etc.).</a:t>
-            </a:r>
+            <a:endParaRPr lang="en-AU" sz="2200" dirty="0"/>
           </a:p>
           <a:p>
-            <a:pPr lvl="1"/>
             <a:r>
-              <a:rPr lang="en-US" b="0" i="0" dirty="0">
-                <a:solidFill>
-                  <a:srgbClr val="2B2B2B"/>
-                </a:solidFill>
-                <a:effectLst/>
-                <a:latin typeface="Roboto" panose="02000000000000000000" pitchFamily="2" charset="0"/>
-              </a:rPr>
-              <a:t>A combination of web scraping and Leaflet or </a:t>
+              <a:rPr lang="en-AU" sz="2200" dirty="0"/>
+              <a:t>Let’s explore how we went about this process…</a:t>
             </a:r>
-            <a:r>
-              <a:rPr lang="en-US" b="0" i="0" dirty="0" err="1">
-                <a:solidFill>
-                  <a:srgbClr val="2B2B2B"/>
-                </a:solidFill>
-                <a:effectLst/>
-                <a:latin typeface="Roboto" panose="02000000000000000000" pitchFamily="2" charset="0"/>
-              </a:rPr>
-              <a:t>Plotly</a:t>
-            </a:r>
-            <a:endParaRPr lang="en-US" b="0" i="0" dirty="0">
-              <a:solidFill>
-                <a:srgbClr val="2B2B2B"/>
-              </a:solidFill>
-              <a:effectLst/>
-              <a:latin typeface="Roboto" panose="02000000000000000000" pitchFamily="2" charset="0"/>
-            </a:endParaRPr>
-          </a:p>
-          <a:p>
-            <a:pPr marL="0" indent="0">
-              <a:buNone/>
-            </a:pPr>
-            <a:endParaRPr lang="en-AU" sz="2200" dirty="0"/>
           </a:p>
         </p:txBody>
       </p:sp>
@@ -20888,7 +20630,7 @@
           <a:lstStyle/>
           <a:p>
             <a:r>
-              <a:rPr lang="en-AU" sz="5400" dirty="0"/>
+              <a:rPr lang="en-AU" sz="5400" b="1" dirty="0"/>
               <a:t>Data Techniques</a:t>
             </a:r>
           </a:p>
@@ -21238,12 +20980,6 @@
             <a:r>
               <a:rPr lang="en-AU" sz="2200" dirty="0"/>
               <a:t>JavaScript</a:t>
-            </a:r>
-          </a:p>
-          <a:p>
-            <a:r>
-              <a:rPr lang="en-AU" sz="2200" dirty="0"/>
-              <a:t>D3</a:t>
             </a:r>
           </a:p>
           <a:p>
@@ -21638,8 +21374,8 @@
           <a:p>
             <a:pPr algn="l"/>
             <a:r>
-              <a:rPr lang="en-US" sz="4000" dirty="0"/>
-              <a:t>Project implementation</a:t>
+              <a:rPr lang="en-US" sz="4000" b="1" dirty="0"/>
+              <a:t>Project Implementation</a:t>
             </a:r>
           </a:p>
         </p:txBody>
@@ -21831,156 +21567,129 @@
         </p:spPr>
         <p:txBody>
           <a:bodyPr vert="horz" lIns="91440" tIns="45720" rIns="91440" bIns="45720" rtlCol="0" anchor="t">
-            <a:normAutofit fontScale="92500" lnSpcReduction="10000"/>
+            <a:normAutofit/>
           </a:bodyPr>
           <a:lstStyle/>
           <a:p>
-            <a:pPr indent="-228600" algn="l">
+            <a:pPr marL="342900" indent="-342900" algn="l">
+              <a:buFont typeface="+mj-lt"/>
+              <a:buAutoNum type="arabicParenR"/>
+            </a:pPr>
+            <a:r>
+              <a:rPr lang="en-US" sz="1400" dirty="0"/>
+              <a:t>Find a dataset for COVID-19. Data obtained from WHO</a:t>
+            </a:r>
+          </a:p>
+          <a:p>
+            <a:pPr marL="342900" indent="-342900" algn="l">
+              <a:buFont typeface="+mj-lt"/>
+              <a:buAutoNum type="arabicParenR"/>
+            </a:pPr>
+            <a:r>
+              <a:rPr lang="en-US" sz="1400" dirty="0"/>
+              <a:t>WHO-COVID-19-global-data.csv was read into Covid-19ETL.ipynb </a:t>
+            </a:r>
+          </a:p>
+          <a:p>
+            <a:pPr marL="800100" lvl="1" indent="-342900" algn="l">
               <a:buFont typeface="Arial" panose="020B0604020202020204" pitchFamily="34" charset="0"/>
               <a:buChar char="•"/>
             </a:pPr>
             <a:r>
-              <a:rPr lang="en-US" sz="1800" dirty="0"/>
-              <a:t>1). WHO-COVID-19-global-data.csv was read into Covid-19ETL.ipynb </a:t>
+              <a:rPr lang="en-US" sz="1400" dirty="0"/>
+              <a:t>Data exploration and cleaning was performed and unused columns dropped </a:t>
             </a:r>
           </a:p>
           <a:p>
-            <a:pPr marL="285750" indent="-228600" algn="l">
+            <a:pPr marL="800100" lvl="1" indent="-342900" algn="l">
               <a:buFont typeface="Arial" panose="020B0604020202020204" pitchFamily="34" charset="0"/>
               <a:buChar char="•"/>
             </a:pPr>
             <a:r>
-              <a:rPr lang="en-US" sz="1800" dirty="0"/>
-              <a:t> Data cleaning was performed and unused columns dropped </a:t>
+              <a:rPr lang="en-US" sz="1400" dirty="0"/>
+              <a:t>Data was grouped by Country </a:t>
             </a:r>
           </a:p>
           <a:p>
-            <a:pPr marL="285750" indent="-228600" algn="l">
+            <a:pPr marL="800100" lvl="1" indent="-342900" algn="l">
               <a:buFont typeface="Arial" panose="020B0604020202020204" pitchFamily="34" charset="0"/>
               <a:buChar char="•"/>
             </a:pPr>
             <a:r>
-              <a:rPr lang="en-US" sz="1800" dirty="0"/>
-              <a:t>Data was grouped by Country </a:t>
+              <a:rPr lang="en-US" sz="1400" dirty="0"/>
+              <a:t>Latitude and Longitude was added to the dataset using an API</a:t>
             </a:r>
           </a:p>
           <a:p>
-            <a:pPr marL="285750" indent="-228600" algn="l">
+            <a:pPr marL="800100" lvl="1" indent="-342900" algn="l">
               <a:buFont typeface="Arial" panose="020B0604020202020204" pitchFamily="34" charset="0"/>
               <a:buChar char="•"/>
             </a:pPr>
             <a:r>
-              <a:rPr lang="en-US" sz="1800" dirty="0"/>
-              <a:t>Lat and Long was added to the dataset</a:t>
+              <a:rPr lang="en-US" sz="1400" dirty="0"/>
+              <a:t>Cleaned data was loaded into an SQLite Database</a:t>
             </a:r>
           </a:p>
           <a:p>
-            <a:pPr marL="285750" indent="-228600" algn="l">
+            <a:pPr marL="342900" indent="-342900" algn="l">
+              <a:buFont typeface="+mj-lt"/>
+              <a:buAutoNum type="arabicParenR"/>
+            </a:pPr>
+            <a:r>
+              <a:rPr lang="en-US" sz="1400" dirty="0"/>
+              <a:t>app.py    </a:t>
+            </a:r>
+          </a:p>
+          <a:p>
+            <a:pPr marL="742950" lvl="1" indent="-228600" algn="l">
               <a:buFont typeface="Arial" panose="020B0604020202020204" pitchFamily="34" charset="0"/>
               <a:buChar char="•"/>
             </a:pPr>
             <a:r>
-              <a:rPr lang="en-US" sz="1800" dirty="0"/>
-              <a:t> Cleaned data was loaded into an SQLite Database</a:t>
+              <a:rPr lang="en-US" sz="1400" dirty="0"/>
+              <a:t>Pulled in dataset from SQL</a:t>
             </a:r>
           </a:p>
           <a:p>
-            <a:pPr indent="-228600" algn="l">
+            <a:pPr marL="742950" lvl="1" indent="-228600" algn="l">
               <a:buFont typeface="Arial" panose="020B0604020202020204" pitchFamily="34" charset="0"/>
               <a:buChar char="•"/>
             </a:pPr>
             <a:r>
-              <a:rPr lang="en-US" sz="1800" dirty="0"/>
-              <a:t>2). app.py    </a:t>
+              <a:rPr lang="en-US" sz="1400" dirty="0"/>
+              <a:t>A flask app was developed with the following endpoints:  </a:t>
             </a:r>
           </a:p>
           <a:p>
-            <a:pPr marL="285750" indent="-228600" algn="l">
+            <a:pPr marL="742950" lvl="1" indent="-228600" algn="l">
               <a:buFont typeface="Arial" panose="020B0604020202020204" pitchFamily="34" charset="0"/>
               <a:buChar char="•"/>
             </a:pPr>
             <a:r>
-              <a:rPr lang="en-US" sz="1800" dirty="0"/>
-              <a:t>a flask app was developed with the following endpoints:  </a:t>
-            </a:r>
-          </a:p>
-          <a:p>
-            <a:pPr marL="285750" indent="-228600" algn="l">
-              <a:buFont typeface="Arial" panose="020B0604020202020204" pitchFamily="34" charset="0"/>
-              <a:buChar char="•"/>
-            </a:pPr>
-            <a:r>
-              <a:rPr lang="en-US" sz="1800" dirty="0"/>
+              <a:rPr lang="en-US" sz="1400" dirty="0"/>
               <a:t>/ - landing page with rendered index html    </a:t>
             </a:r>
-          </a:p>
-          <a:p>
-            <a:pPr marL="0" marR="0" lvl="0" indent="0" algn="l" defTabSz="914400" rtl="0" eaLnBrk="0" fontAlgn="base" latinLnBrk="0" hangingPunct="0">
-              <a:lnSpc>
-                <a:spcPct val="100000"/>
-              </a:lnSpc>
-              <a:spcBef>
-                <a:spcPct val="0"/>
-              </a:spcBef>
-              <a:spcAft>
-                <a:spcPct val="0"/>
-              </a:spcAft>
-              <a:buClrTx/>
-              <a:buSzTx/>
-              <a:buFontTx/>
-              <a:buChar char="•"/>
-              <a:tabLst/>
-            </a:pPr>
             <a:r>
-              <a:rPr kumimoji="0" lang="en-US" altLang="en-US" sz="1800" b="0" i="0" u="none" strike="noStrike" cap="none" normalizeH="0" baseline="0" dirty="0">
-                <a:ln>
-                  <a:noFill/>
-                </a:ln>
-                <a:solidFill>
-                  <a:srgbClr val="1F2328"/>
-                </a:solidFill>
-                <a:effectLst/>
-              </a:rPr>
-              <a:t> (‘/</a:t>
+              <a:rPr lang="en-US" altLang="en-US" sz="1400" dirty="0"/>
+              <a:t>(‘/</a:t>
             </a:r>
             <a:r>
-              <a:rPr kumimoji="0" lang="en-US" altLang="en-US" sz="1800" b="0" i="0" u="none" strike="noStrike" cap="none" normalizeH="0" baseline="0" dirty="0" err="1">
-                <a:ln>
-                  <a:noFill/>
-                </a:ln>
-                <a:solidFill>
-                  <a:srgbClr val="1F2328"/>
-                </a:solidFill>
-                <a:effectLst/>
-              </a:rPr>
+              <a:rPr lang="en-US" altLang="en-US" sz="1400" dirty="0" err="1"/>
               <a:t>api</a:t>
             </a:r>
             <a:r>
-              <a:rPr kumimoji="0" lang="en-US" altLang="en-US" sz="1800" b="0" i="0" u="none" strike="noStrike" cap="none" normalizeH="0" baseline="0" dirty="0">
-                <a:ln>
-                  <a:noFill/>
-                </a:ln>
-                <a:solidFill>
-                  <a:srgbClr val="1F2328"/>
-                </a:solidFill>
-                <a:effectLst/>
-              </a:rPr>
-              <a:t>/covid’) - returns covid data in JSON format</a:t>
+              <a:rPr lang="en-US" altLang="en-US" sz="1400" dirty="0"/>
+              <a:t>/covid’) - returns covid data in </a:t>
             </a:r>
-          </a:p>
-          <a:p>
-            <a:pPr marL="285750" indent="-228600" algn="l">
-              <a:buFont typeface="Arial" panose="020B0604020202020204" pitchFamily="34" charset="0"/>
-              <a:buChar char="•"/>
-            </a:pPr>
+            <a:r>
+              <a:rPr lang="en-US" altLang="en-US" sz="1400" dirty="0" err="1"/>
+              <a:t>GeoJSON</a:t>
+            </a:r>
+            <a:r>
+              <a:rPr lang="en-US" altLang="en-US" sz="1400" dirty="0"/>
+              <a:t> format</a:t>
+            </a:r>
             <a:endParaRPr lang="en-US" sz="1400" dirty="0"/>
-          </a:p>
-          <a:p>
-            <a:pPr marL="285750" indent="-228600" algn="l">
-              <a:buFont typeface="Arial" panose="020B0604020202020204" pitchFamily="34" charset="0"/>
-              <a:buChar char="•"/>
-            </a:pPr>
-            <a:endParaRPr lang="en-US" sz="1100" dirty="0"/>
           </a:p>
         </p:txBody>
       </p:sp>
@@ -22113,7 +21822,7 @@
       </p:grpSpPr>
       <p:sp useBgFill="1">
         <p:nvSpPr>
-          <p:cNvPr id="14" name="Rectangle 13">
+          <p:cNvPr id="17" name="Rectangle 13">
             <a:extLst>
               <a:ext uri="{FF2B5EF4-FFF2-40B4-BE49-F238E27FC236}">
                 <a16:creationId xmlns:a16="http://schemas.microsoft.com/office/drawing/2014/main" id="{94E4D846-3AFC-4F86-8C35-24B0542A269D}"/>
@@ -22193,7 +21902,7 @@
         <p:spPr>
           <a:xfrm>
             <a:off x="20" y="10"/>
-            <a:ext cx="8668492" cy="6857990"/>
+            <a:ext cx="7591225" cy="6839702"/>
           </a:xfrm>
           <a:prstGeom prst="rect">
             <a:avLst/>
@@ -22304,20 +22013,20 @@
         </p:nvSpPr>
         <p:spPr>
           <a:xfrm>
-            <a:off x="7529004" y="1086329"/>
-            <a:ext cx="4245464" cy="1124712"/>
+            <a:off x="7461849" y="1161288"/>
+            <a:ext cx="4346765" cy="1124712"/>
           </a:xfrm>
         </p:spPr>
         <p:txBody>
           <a:bodyPr vert="horz" lIns="91440" tIns="45720" rIns="91440" bIns="45720" rtlCol="0" anchor="b">
-            <a:noAutofit/>
+            <a:normAutofit fontScale="90000"/>
           </a:bodyPr>
           <a:lstStyle/>
           <a:p>
             <a:pPr algn="l"/>
             <a:r>
-              <a:rPr lang="en-US" sz="3600" dirty="0"/>
-              <a:t>Project implementation cont.</a:t>
+              <a:rPr lang="en-US" sz="4000" b="1" dirty="0"/>
+              <a:t>Project Implementation cont.</a:t>
             </a:r>
           </a:p>
         </p:txBody>
@@ -22503,104 +22212,207 @@
         </p:nvSpPr>
         <p:spPr>
           <a:xfrm>
-            <a:off x="7535970" y="2452624"/>
-            <a:ext cx="4278516" cy="3881154"/>
+            <a:off x="7323826" y="2530602"/>
+            <a:ext cx="4485550" cy="4068606"/>
           </a:xfrm>
         </p:spPr>
         <p:txBody>
           <a:bodyPr vert="horz" lIns="91440" tIns="45720" rIns="91440" bIns="45720" rtlCol="0" anchor="t">
-            <a:noAutofit/>
+            <a:normAutofit/>
           </a:bodyPr>
           <a:lstStyle/>
           <a:p>
-            <a:pPr indent="-228600" algn="l">
+            <a:pPr marL="342900" indent="-342900" algn="l">
+              <a:buFont typeface="+mj-lt"/>
+              <a:buAutoNum type="arabicParenR" startAt="4"/>
+            </a:pPr>
+            <a:r>
+              <a:rPr lang="en-US" sz="1400" dirty="0"/>
+              <a:t>Index.html - accesses all the libraries being used in the dashboard and displays the page contents</a:t>
+            </a:r>
+          </a:p>
+          <a:p>
+            <a:pPr marL="342900" indent="-342900" algn="l">
+              <a:buFont typeface="+mj-lt"/>
+              <a:buAutoNum type="arabicParenR" startAt="4"/>
+            </a:pPr>
+            <a:r>
+              <a:rPr lang="en-US" sz="1400" dirty="0"/>
+              <a:t>Logic.js    </a:t>
+            </a:r>
+          </a:p>
+          <a:p>
+            <a:pPr marL="800100" lvl="1" indent="-285750" algn="l">
               <a:buFont typeface="Arial" panose="020B0604020202020204" pitchFamily="34" charset="0"/>
               <a:buChar char="•"/>
             </a:pPr>
             <a:r>
-              <a:rPr lang="en-US" sz="1600" dirty="0"/>
-              <a:t>3). index.html - accesses all the libraries being used in the dashboard and displays the page contents</a:t>
+              <a:rPr lang="en-US" sz="1400" dirty="0"/>
+              <a:t>Pulled in dataset from ‘</a:t>
             </a:r>
+            <a:r>
+              <a:rPr lang="en-US" altLang="en-US" sz="1400" dirty="0"/>
+              <a:t>/</a:t>
+            </a:r>
+            <a:r>
+              <a:rPr lang="en-US" altLang="en-US" sz="1400" dirty="0" err="1"/>
+              <a:t>api</a:t>
+            </a:r>
+            <a:r>
+              <a:rPr lang="en-US" altLang="en-US" sz="1400" dirty="0"/>
+              <a:t>/covid’ using D3</a:t>
+            </a:r>
+            <a:endParaRPr lang="en-US" sz="1400" dirty="0"/>
           </a:p>
           <a:p>
-            <a:pPr indent="-228600" algn="l">
+            <a:pPr marL="800100" lvl="1" indent="-285750" algn="l">
               <a:buFont typeface="Arial" panose="020B0604020202020204" pitchFamily="34" charset="0"/>
               <a:buChar char="•"/>
             </a:pPr>
             <a:r>
-              <a:rPr lang="en-US" sz="1600" dirty="0"/>
-              <a:t>4). logic.js    </a:t>
+              <a:rPr lang="en-US" sz="1400" dirty="0"/>
+              <a:t>Leaflet to draw a map of the world and hold the cases and deaths data    </a:t>
             </a:r>
           </a:p>
           <a:p>
-            <a:pPr marL="285750" indent="-228600" algn="l">
+            <a:pPr marL="800100" lvl="1" indent="-285750" algn="l">
               <a:buFont typeface="Arial" panose="020B0604020202020204" pitchFamily="34" charset="0"/>
               <a:buChar char="•"/>
             </a:pPr>
             <a:r>
-              <a:rPr lang="en-US" sz="1600" dirty="0"/>
-              <a:t> leaflet to draw a map of the world and hold the cases and deaths data    </a:t>
+              <a:rPr lang="en-US" sz="1400" dirty="0"/>
+              <a:t>Click on country (pop ups) to identify the number of cases and deaths per country  </a:t>
             </a:r>
           </a:p>
           <a:p>
-            <a:pPr marL="285750" indent="-228600" algn="l">
+            <a:pPr marL="800100" lvl="1" indent="-285750" algn="l">
               <a:buFont typeface="Arial" panose="020B0604020202020204" pitchFamily="34" charset="0"/>
               <a:buChar char="•"/>
             </a:pPr>
             <a:r>
-              <a:rPr lang="en-US" sz="1600" dirty="0"/>
-              <a:t>Click on country to identify the number of cases and deaths per country  </a:t>
+              <a:rPr lang="en-US" sz="1400" dirty="0"/>
+              <a:t>Drop down menu to select on either cases or deaths</a:t>
             </a:r>
           </a:p>
           <a:p>
-            <a:pPr marL="285750" indent="-228600" algn="l">
+            <a:pPr marL="800100" lvl="1" indent="-285750" algn="l">
               <a:buFont typeface="Arial" panose="020B0604020202020204" pitchFamily="34" charset="0"/>
               <a:buChar char="•"/>
             </a:pPr>
             <a:r>
-              <a:rPr lang="en-US" sz="1600" dirty="0"/>
-              <a:t>drop down menu to select on either cases or deaths</a:t>
+              <a:rPr lang="en-US" sz="1400" dirty="0" err="1"/>
+              <a:t>Plotly</a:t>
+            </a:r>
+            <a:r>
+              <a:rPr lang="en-US" sz="1400" dirty="0"/>
+              <a:t> to develop a bar chart of cumulative cases and deaths</a:t>
             </a:r>
           </a:p>
           <a:p>
-            <a:pPr marL="285750" indent="-228600" algn="l">
-              <a:buFont typeface="Arial" panose="020B0604020202020204" pitchFamily="34" charset="0"/>
-              <a:buChar char="•"/>
+            <a:pPr marL="342900" indent="-342900" algn="l">
+              <a:buFont typeface="+mj-lt"/>
+              <a:buAutoNum type="arabicParenR" startAt="6"/>
             </a:pPr>
             <a:r>
-              <a:rPr lang="en-US" sz="1600" dirty="0" err="1"/>
-              <a:t>plotly</a:t>
-            </a:r>
-            <a:r>
-              <a:rPr lang="en-US" sz="1600" dirty="0"/>
-              <a:t> to develop a bar chart of, cumulative cases and deaths</a:t>
+              <a:rPr lang="en-US" sz="1400" dirty="0"/>
+              <a:t>Style.css - applying style to the html page contents</a:t>
             </a:r>
           </a:p>
+        </p:txBody>
+      </p:sp>
+      <p:sp>
+        <p:nvSpPr>
+          <p:cNvPr id="4" name="Rectangle 1">
+            <a:extLst>
+              <a:ext uri="{FF2B5EF4-FFF2-40B4-BE49-F238E27FC236}">
+                <a16:creationId xmlns:a16="http://schemas.microsoft.com/office/drawing/2014/main" id="{26C3085A-0BDB-1CD8-54D5-024127F0CFB9}"/>
+              </a:ext>
+            </a:extLst>
+          </p:cNvPr>
+          <p:cNvSpPr>
+            <a:spLocks noChangeArrowheads="1"/>
+          </p:cNvSpPr>
+          <p:nvPr/>
+        </p:nvSpPr>
+        <p:spPr bwMode="auto">
+          <a:xfrm>
+            <a:off x="0" y="-138499"/>
+            <a:ext cx="65" cy="276999"/>
+          </a:xfrm>
+          <a:prstGeom prst="rect">
+            <a:avLst/>
+          </a:prstGeom>
+          <a:solidFill>
+            <a:srgbClr val="FFFFFF"/>
+          </a:solidFill>
+          <a:ln>
+            <a:noFill/>
+          </a:ln>
+          <a:effectLst/>
+          <a:extLst>
+            <a:ext uri="{91240B29-F687-4F45-9708-019B960494DF}">
+              <a14:hiddenLine xmlns:a14="http://schemas.microsoft.com/office/drawing/2010/main" w="9525">
+                <a:solidFill>
+                  <a:schemeClr val="tx1"/>
+                </a:solidFill>
+                <a:miter lim="800000"/>
+                <a:headEnd/>
+                <a:tailEnd/>
+              </a14:hiddenLine>
+            </a:ext>
+            <a:ext uri="{AF507438-7753-43E0-B8FC-AC1667EBCBE1}">
+              <a14:hiddenEffects xmlns:a14="http://schemas.microsoft.com/office/drawing/2010/main">
+                <a:effectLst>
+                  <a:outerShdw dist="35921" dir="2700000" algn="ctr" rotWithShape="0">
+                    <a:schemeClr val="bg2"/>
+                  </a:outerShdw>
+                </a:effectLst>
+              </a14:hiddenEffects>
+            </a:ext>
+          </a:extLst>
+        </p:spPr>
+        <p:txBody>
+          <a:bodyPr vert="horz" wrap="none" lIns="0" tIns="0" rIns="0" bIns="0" numCol="1" anchor="ctr" anchorCtr="0" compatLnSpc="1">
+            <a:prstTxWarp prst="textNoShape">
+              <a:avLst/>
+            </a:prstTxWarp>
+            <a:spAutoFit/>
+          </a:bodyPr>
+          <a:lstStyle/>
           <a:p>
-            <a:pPr indent="-228600" algn="l">
-              <a:buFont typeface="Arial" panose="020B0604020202020204" pitchFamily="34" charset="0"/>
-              <a:buChar char="•"/>
+            <a:pPr marL="0" marR="0" lvl="0" indent="0" algn="l" defTabSz="914400" rtl="0" eaLnBrk="0" fontAlgn="base" latinLnBrk="0" hangingPunct="0">
+              <a:lnSpc>
+                <a:spcPct val="100000"/>
+              </a:lnSpc>
+              <a:spcBef>
+                <a:spcPct val="0"/>
+              </a:spcBef>
+              <a:spcAft>
+                <a:spcPct val="0"/>
+              </a:spcAft>
+              <a:buClrTx/>
+              <a:buSzTx/>
+              <a:buFontTx/>
+              <a:buNone/>
+              <a:tabLst/>
             </a:pPr>
-            <a:r>
-              <a:rPr lang="en-US" sz="1600" dirty="0"/>
-              <a:t>5). style.css - applying style to the html </a:t>
-            </a:r>
-            <a:r>
-              <a:rPr lang="en-US" sz="1800" dirty="0"/>
-              <a:t>page </a:t>
-            </a:r>
-            <a:r>
-              <a:rPr lang="en-US" sz="1600" dirty="0"/>
-              <a:t>contents</a:t>
-            </a:r>
-            <a:endParaRPr lang="en-US" sz="1800" dirty="0"/>
+            <a:endParaRPr kumimoji="0" lang="en-US" altLang="en-US" sz="1800" b="0" i="0" u="none" strike="noStrike" cap="none" normalizeH="0" baseline="0" dirty="0">
+              <a:ln>
+                <a:noFill/>
+              </a:ln>
+              <a:solidFill>
+                <a:schemeClr val="tx1"/>
+              </a:solidFill>
+              <a:effectLst/>
+              <a:latin typeface="Arial" panose="020B0604020202020204" pitchFamily="34" charset="0"/>
+            </a:endParaRPr>
           </a:p>
         </p:txBody>
       </p:sp>
     </p:spTree>
     <p:extLst>
       <p:ext uri="{BB962C8B-B14F-4D97-AF65-F5344CB8AC3E}">
-        <p14:creationId xmlns:p14="http://schemas.microsoft.com/office/powerpoint/2010/main" val="1812677092"/>
+        <p14:creationId xmlns:p14="http://schemas.microsoft.com/office/powerpoint/2010/main" val="88934229"/>
       </p:ext>
     </p:extLst>
   </p:cSld>
@@ -22611,378 +22423,6 @@
 </file>
 
 <file path=ppt/slides/slide8.xml><?xml version="1.0" encoding="utf-8"?>
-<p:sld xmlns:a="http://schemas.openxmlformats.org/drawingml/2006/main" xmlns:r="http://schemas.openxmlformats.org/officeDocument/2006/relationships" xmlns:p="http://schemas.openxmlformats.org/presentationml/2006/main">
-  <p:cSld>
-    <p:bg>
-      <p:bgPr>
-        <a:solidFill>
-          <a:schemeClr val="bg1"/>
-        </a:solidFill>
-        <a:effectLst/>
-      </p:bgPr>
-    </p:bg>
-    <p:spTree>
-      <p:nvGrpSpPr>
-        <p:cNvPr id="1" name=""/>
-        <p:cNvGrpSpPr/>
-        <p:nvPr/>
-      </p:nvGrpSpPr>
-      <p:grpSpPr>
-        <a:xfrm>
-          <a:off x="0" y="0"/>
-          <a:ext cx="0" cy="0"/>
-          <a:chOff x="0" y="0"/>
-          <a:chExt cx="0" cy="0"/>
-        </a:xfrm>
-      </p:grpSpPr>
-      <p:sp useBgFill="1">
-        <p:nvSpPr>
-          <p:cNvPr id="15" name="Rectangle 9">
-            <a:extLst>
-              <a:ext uri="{FF2B5EF4-FFF2-40B4-BE49-F238E27FC236}">
-                <a16:creationId xmlns:a16="http://schemas.microsoft.com/office/drawing/2014/main" id="{AB8C311F-7253-4AED-9701-7FC0708C41C7}"/>
-              </a:ext>
-              <a:ext uri="{C183D7F6-B498-43B3-948B-1728B52AA6E4}">
-                <adec:decorative xmlns:adec="http://schemas.microsoft.com/office/drawing/2017/decorative" val="1"/>
-              </a:ext>
-            </a:extLst>
-          </p:cNvPr>
-          <p:cNvSpPr>
-            <a:spLocks noGrp="1" noRot="1" noChangeAspect="1" noMove="1" noResize="1" noEditPoints="1" noAdjustHandles="1" noChangeArrowheads="1" noChangeShapeType="1" noTextEdit="1"/>
-          </p:cNvSpPr>
-          <p:nvPr>
-            <p:extLst>
-              <p:ext uri="{386F3935-93C4-4BCD-93E2-E3B085C9AB24}">
-                <p16:designElem xmlns:p16="http://schemas.microsoft.com/office/powerpoint/2015/main" val="1"/>
-              </p:ext>
-            </p:extLst>
-          </p:nvPr>
-        </p:nvSpPr>
-        <p:spPr>
-          <a:xfrm>
-            <a:off x="0" y="0"/>
-            <a:ext cx="12192000" cy="6858000"/>
-          </a:xfrm>
-          <a:prstGeom prst="rect">
-            <a:avLst/>
-          </a:prstGeom>
-          <a:ln w="12700" cap="flat" cmpd="sng" algn="ctr">
-            <a:noFill/>
-            <a:prstDash val="solid"/>
-            <a:miter lim="800000"/>
-          </a:ln>
-          <a:effectLst/>
-          <a:extLst>
-            <a:ext uri="{91240B29-F687-4F45-9708-019B960494DF}">
-              <a14:hiddenLine xmlns:a14="http://schemas.microsoft.com/office/drawing/2010/main" w="12700" cap="flat" cmpd="sng" algn="ctr">
-                <a:solidFill>
-                  <a:schemeClr val="accent1">
-                    <a:shade val="50000"/>
-                  </a:schemeClr>
-                </a:solidFill>
-                <a:prstDash val="solid"/>
-                <a:miter lim="800000"/>
-              </a14:hiddenLine>
-            </a:ext>
-          </a:extLst>
-        </p:spPr>
-        <p:style>
-          <a:lnRef idx="2">
-            <a:schemeClr val="accent1">
-              <a:shade val="50000"/>
-            </a:schemeClr>
-          </a:lnRef>
-          <a:fillRef idx="1">
-            <a:schemeClr val="accent1"/>
-          </a:fillRef>
-          <a:effectRef idx="0">
-            <a:schemeClr val="accent1"/>
-          </a:effectRef>
-          <a:fontRef idx="minor">
-            <a:schemeClr val="lt1"/>
-          </a:fontRef>
-        </p:style>
-        <p:txBody>
-          <a:bodyPr rtlCol="0" anchor="ctr"/>
-          <a:lstStyle/>
-          <a:p>
-            <a:pPr algn="ctr"/>
-            <a:endParaRPr lang="en-US"/>
-          </a:p>
-        </p:txBody>
-      </p:sp>
-      <p:sp>
-        <p:nvSpPr>
-          <p:cNvPr id="17" name="Rectangle 11">
-            <a:extLst>
-              <a:ext uri="{FF2B5EF4-FFF2-40B4-BE49-F238E27FC236}">
-                <a16:creationId xmlns:a16="http://schemas.microsoft.com/office/drawing/2014/main" id="{E2384209-CB15-4CDF-9D31-C44FD9A3F20D}"/>
-              </a:ext>
-              <a:ext uri="{C183D7F6-B498-43B3-948B-1728B52AA6E4}">
-                <adec:decorative xmlns:adec="http://schemas.microsoft.com/office/drawing/2017/decorative" val="1"/>
-              </a:ext>
-            </a:extLst>
-          </p:cNvPr>
-          <p:cNvSpPr>
-            <a:spLocks noGrp="1" noRot="1" noChangeAspect="1" noMove="1" noResize="1" noEditPoints="1" noAdjustHandles="1" noChangeArrowheads="1" noChangeShapeType="1" noTextEdit="1"/>
-          </p:cNvSpPr>
-          <p:nvPr>
-            <p:extLst>
-              <p:ext uri="{386F3935-93C4-4BCD-93E2-E3B085C9AB24}">
-                <p16:designElem xmlns:p16="http://schemas.microsoft.com/office/powerpoint/2015/main" val="1"/>
-              </p:ext>
-            </p:extLst>
-          </p:nvPr>
-        </p:nvSpPr>
-        <p:spPr>
-          <a:xfrm rot="16200000" flipH="1">
-            <a:off x="2666617" y="-2666188"/>
-            <a:ext cx="6858000" cy="12191233"/>
-          </a:xfrm>
-          <a:prstGeom prst="rect">
-            <a:avLst/>
-          </a:prstGeom>
-          <a:gradFill>
-            <a:gsLst>
-              <a:gs pos="8000">
-                <a:schemeClr val="accent1"/>
-              </a:gs>
-              <a:gs pos="100000">
-                <a:schemeClr val="accent1">
-                  <a:lumMod val="50000"/>
-                </a:schemeClr>
-              </a:gs>
-            </a:gsLst>
-            <a:lin ang="12000000" scaled="0"/>
-          </a:gradFill>
-          <a:ln>
-            <a:noFill/>
-          </a:ln>
-        </p:spPr>
-        <p:style>
-          <a:lnRef idx="2">
-            <a:schemeClr val="accent1">
-              <a:shade val="50000"/>
-            </a:schemeClr>
-          </a:lnRef>
-          <a:fillRef idx="1">
-            <a:schemeClr val="accent1"/>
-          </a:fillRef>
-          <a:effectRef idx="0">
-            <a:schemeClr val="accent1"/>
-          </a:effectRef>
-          <a:fontRef idx="minor">
-            <a:schemeClr val="lt1"/>
-          </a:fontRef>
-        </p:style>
-        <p:txBody>
-          <a:bodyPr rtlCol="0" anchor="ctr"/>
-          <a:lstStyle/>
-          <a:p>
-            <a:pPr algn="ctr"/>
-            <a:endParaRPr lang="en-US"/>
-          </a:p>
-        </p:txBody>
-      </p:sp>
-      <p:sp>
-        <p:nvSpPr>
-          <p:cNvPr id="14" name="Rectangle 13">
-            <a:extLst>
-              <a:ext uri="{FF2B5EF4-FFF2-40B4-BE49-F238E27FC236}">
-                <a16:creationId xmlns:a16="http://schemas.microsoft.com/office/drawing/2014/main" id="{2633B3B5-CC90-43F0-8714-D31D1F3F0209}"/>
-              </a:ext>
-              <a:ext uri="{C183D7F6-B498-43B3-948B-1728B52AA6E4}">
-                <adec:decorative xmlns:adec="http://schemas.microsoft.com/office/drawing/2017/decorative" val="1"/>
-              </a:ext>
-            </a:extLst>
-          </p:cNvPr>
-          <p:cNvSpPr>
-            <a:spLocks noGrp="1" noRot="1" noChangeAspect="1" noMove="1" noResize="1" noEditPoints="1" noAdjustHandles="1" noChangeArrowheads="1" noChangeShapeType="1" noTextEdit="1"/>
-          </p:cNvSpPr>
-          <p:nvPr>
-            <p:extLst>
-              <p:ext uri="{386F3935-93C4-4BCD-93E2-E3B085C9AB24}">
-                <p16:designElem xmlns:p16="http://schemas.microsoft.com/office/powerpoint/2015/main" val="1"/>
-              </p:ext>
-            </p:extLst>
-          </p:nvPr>
-        </p:nvSpPr>
-        <p:spPr>
-          <a:xfrm rot="10800000" flipH="1">
-            <a:off x="-2311" y="0"/>
-            <a:ext cx="9070846" cy="6857572"/>
-          </a:xfrm>
-          <a:prstGeom prst="rect">
-            <a:avLst/>
-          </a:prstGeom>
-          <a:gradFill>
-            <a:gsLst>
-              <a:gs pos="8000">
-                <a:srgbClr val="000000">
-                  <a:alpha val="52000"/>
-                </a:srgbClr>
-              </a:gs>
-              <a:gs pos="100000">
-                <a:schemeClr val="accent1"/>
-              </a:gs>
-            </a:gsLst>
-            <a:lin ang="4800000" scaled="0"/>
-          </a:gradFill>
-          <a:ln>
-            <a:noFill/>
-          </a:ln>
-        </p:spPr>
-        <p:style>
-          <a:lnRef idx="2">
-            <a:schemeClr val="accent1">
-              <a:shade val="50000"/>
-            </a:schemeClr>
-          </a:lnRef>
-          <a:fillRef idx="1">
-            <a:schemeClr val="accent1"/>
-          </a:fillRef>
-          <a:effectRef idx="0">
-            <a:schemeClr val="accent1"/>
-          </a:effectRef>
-          <a:fontRef idx="minor">
-            <a:schemeClr val="lt1"/>
-          </a:fontRef>
-        </p:style>
-        <p:txBody>
-          <a:bodyPr rtlCol="0" anchor="ctr"/>
-          <a:lstStyle/>
-          <a:p>
-            <a:pPr algn="ctr"/>
-            <a:endParaRPr lang="en-US"/>
-          </a:p>
-        </p:txBody>
-      </p:sp>
-      <p:sp>
-        <p:nvSpPr>
-          <p:cNvPr id="16" name="Rectangle 15">
-            <a:extLst>
-              <a:ext uri="{FF2B5EF4-FFF2-40B4-BE49-F238E27FC236}">
-                <a16:creationId xmlns:a16="http://schemas.microsoft.com/office/drawing/2014/main" id="{A8D57A06-A426-446D-B02C-A2DC6B62E45E}"/>
-              </a:ext>
-              <a:ext uri="{C183D7F6-B498-43B3-948B-1728B52AA6E4}">
-                <adec:decorative xmlns:adec="http://schemas.microsoft.com/office/drawing/2017/decorative" val="1"/>
-              </a:ext>
-            </a:extLst>
-          </p:cNvPr>
-          <p:cNvSpPr>
-            <a:spLocks noGrp="1" noRot="1" noChangeAspect="1" noMove="1" noResize="1" noEditPoints="1" noAdjustHandles="1" noChangeArrowheads="1" noChangeShapeType="1" noTextEdit="1"/>
-          </p:cNvSpPr>
-          <p:nvPr>
-            <p:extLst>
-              <p:ext uri="{386F3935-93C4-4BCD-93E2-E3B085C9AB24}">
-                <p16:designElem xmlns:p16="http://schemas.microsoft.com/office/powerpoint/2015/main" val="1"/>
-              </p:ext>
-            </p:extLst>
-          </p:nvPr>
-        </p:nvSpPr>
-        <p:spPr>
-          <a:xfrm rot="16200000" flipH="1">
-            <a:off x="3649491" y="-1685840"/>
-            <a:ext cx="4894564" cy="12193546"/>
-          </a:xfrm>
-          <a:prstGeom prst="rect">
-            <a:avLst/>
-          </a:prstGeom>
-          <a:gradFill>
-            <a:gsLst>
-              <a:gs pos="0">
-                <a:schemeClr val="accent5">
-                  <a:lumMod val="60000"/>
-                  <a:lumOff val="40000"/>
-                  <a:alpha val="0"/>
-                </a:schemeClr>
-              </a:gs>
-              <a:gs pos="100000">
-                <a:srgbClr val="000000">
-                  <a:alpha val="46000"/>
-                </a:srgbClr>
-              </a:gs>
-            </a:gsLst>
-            <a:lin ang="1200000" scaled="0"/>
-          </a:gradFill>
-          <a:ln>
-            <a:noFill/>
-          </a:ln>
-        </p:spPr>
-        <p:style>
-          <a:lnRef idx="2">
-            <a:schemeClr val="accent1">
-              <a:shade val="50000"/>
-            </a:schemeClr>
-          </a:lnRef>
-          <a:fillRef idx="1">
-            <a:schemeClr val="accent1"/>
-          </a:fillRef>
-          <a:effectRef idx="0">
-            <a:schemeClr val="accent1"/>
-          </a:effectRef>
-          <a:fontRef idx="minor">
-            <a:schemeClr val="lt1"/>
-          </a:fontRef>
-        </p:style>
-        <p:txBody>
-          <a:bodyPr rtlCol="0" anchor="ctr"/>
-          <a:lstStyle/>
-          <a:p>
-            <a:pPr algn="ctr"/>
-            <a:endParaRPr lang="en-US"/>
-          </a:p>
-        </p:txBody>
-      </p:sp>
-      <p:pic>
-        <p:nvPicPr>
-          <p:cNvPr id="5" name="Picture 4" descr="A map of the world with black circles&#10;&#10;Description automatically generated">
-            <a:extLst>
-              <a:ext uri="{FF2B5EF4-FFF2-40B4-BE49-F238E27FC236}">
-                <a16:creationId xmlns:a16="http://schemas.microsoft.com/office/drawing/2014/main" id="{0DCA503E-1755-A2EA-C3A7-B51C919B11BB}"/>
-              </a:ext>
-            </a:extLst>
-          </p:cNvPr>
-          <p:cNvPicPr>
-            <a:picLocks noChangeAspect="1"/>
-          </p:cNvPicPr>
-          <p:nvPr/>
-        </p:nvPicPr>
-        <p:blipFill rotWithShape="1">
-          <a:blip r:embed="rId2">
-            <a:extLst>
-              <a:ext uri="{28A0092B-C50C-407E-A947-70E740481C1C}">
-                <a14:useLocalDpi xmlns:a14="http://schemas.microsoft.com/office/drawing/2010/main" val="0"/>
-              </a:ext>
-            </a:extLst>
-          </a:blip>
-          <a:srcRect b="2852"/>
-          <a:stretch/>
-        </p:blipFill>
-        <p:spPr>
-          <a:xfrm>
-            <a:off x="457200" y="457200"/>
-            <a:ext cx="11277600" cy="5943600"/>
-          </a:xfrm>
-          <a:prstGeom prst="rect">
-            <a:avLst/>
-          </a:prstGeom>
-        </p:spPr>
-      </p:pic>
-    </p:spTree>
-    <p:extLst>
-      <p:ext uri="{BB962C8B-B14F-4D97-AF65-F5344CB8AC3E}">
-        <p14:creationId xmlns:p14="http://schemas.microsoft.com/office/powerpoint/2010/main" val="3079774500"/>
-      </p:ext>
-    </p:extLst>
-  </p:cSld>
-  <p:clrMapOvr>
-    <a:masterClrMapping/>
-  </p:clrMapOvr>
-</p:sld>
-</file>
-
-<file path=ppt/slides/slide9.xml><?xml version="1.0" encoding="utf-8"?>
 <p:sld xmlns:a="http://schemas.openxmlformats.org/drawingml/2006/main" xmlns:r="http://schemas.openxmlformats.org/officeDocument/2006/relationships" xmlns:p="http://schemas.openxmlformats.org/presentationml/2006/main">
   <p:cSld>
     <p:bg>
@@ -23308,10 +22748,539 @@
       </p:sp>
       <p:pic>
         <p:nvPicPr>
-          <p:cNvPr id="8" name="Picture 7" descr="A map of the world with black dots&#10;&#10;Description automatically generated">
+          <p:cNvPr id="3" name="Picture 2">
             <a:extLst>
               <a:ext uri="{FF2B5EF4-FFF2-40B4-BE49-F238E27FC236}">
-                <a16:creationId xmlns:a16="http://schemas.microsoft.com/office/drawing/2014/main" id="{C2ED5844-EB9D-EEDE-EC6F-E8C5F310FBF2}"/>
+                <a16:creationId xmlns:a16="http://schemas.microsoft.com/office/drawing/2014/main" id="{7EC99200-5C54-1AF6-5766-2F1284470012}"/>
+              </a:ext>
+            </a:extLst>
+          </p:cNvPr>
+          <p:cNvPicPr>
+            <a:picLocks noChangeAspect="1"/>
+          </p:cNvPicPr>
+          <p:nvPr/>
+        </p:nvPicPr>
+        <p:blipFill>
+          <a:blip r:embed="rId2"/>
+          <a:stretch>
+            <a:fillRect/>
+          </a:stretch>
+        </p:blipFill>
+        <p:spPr>
+          <a:xfrm>
+            <a:off x="144715" y="1201558"/>
+            <a:ext cx="11901804" cy="4575653"/>
+          </a:xfrm>
+          <a:prstGeom prst="rect">
+            <a:avLst/>
+          </a:prstGeom>
+        </p:spPr>
+      </p:pic>
+    </p:spTree>
+    <p:extLst>
+      <p:ext uri="{BB962C8B-B14F-4D97-AF65-F5344CB8AC3E}">
+        <p14:creationId xmlns:p14="http://schemas.microsoft.com/office/powerpoint/2010/main" val="2492437374"/>
+      </p:ext>
+    </p:extLst>
+  </p:cSld>
+  <p:clrMapOvr>
+    <a:masterClrMapping/>
+  </p:clrMapOvr>
+</p:sld>
+</file>
+
+<file path=ppt/slides/slide9.xml><?xml version="1.0" encoding="utf-8"?>
+<p:sld xmlns:a="http://schemas.openxmlformats.org/drawingml/2006/main" xmlns:r="http://schemas.openxmlformats.org/officeDocument/2006/relationships" xmlns:p="http://schemas.openxmlformats.org/presentationml/2006/main">
+  <p:cSld>
+    <p:bg>
+      <p:bgPr>
+        <a:solidFill>
+          <a:schemeClr val="bg1"/>
+        </a:solidFill>
+        <a:effectLst/>
+      </p:bgPr>
+    </p:bg>
+    <p:spTree>
+      <p:nvGrpSpPr>
+        <p:cNvPr id="1" name=""/>
+        <p:cNvGrpSpPr/>
+        <p:nvPr/>
+      </p:nvGrpSpPr>
+      <p:grpSpPr>
+        <a:xfrm>
+          <a:off x="0" y="0"/>
+          <a:ext cx="0" cy="0"/>
+          <a:chOff x="0" y="0"/>
+          <a:chExt cx="0" cy="0"/>
+        </a:xfrm>
+      </p:grpSpPr>
+      <p:sp useBgFill="1">
+        <p:nvSpPr>
+          <p:cNvPr id="9" name="Rectangle 8">
+            <a:extLst>
+              <a:ext uri="{FF2B5EF4-FFF2-40B4-BE49-F238E27FC236}">
+                <a16:creationId xmlns:a16="http://schemas.microsoft.com/office/drawing/2014/main" id="{BCED4D40-4B67-4331-AC48-79B82B4A47D8}"/>
+              </a:ext>
+              <a:ext uri="{C183D7F6-B498-43B3-948B-1728B52AA6E4}">
+                <adec:decorative xmlns:adec="http://schemas.microsoft.com/office/drawing/2017/decorative" val="1"/>
+              </a:ext>
+            </a:extLst>
+          </p:cNvPr>
+          <p:cNvSpPr>
+            <a:spLocks noGrp="1" noRot="1" noChangeAspect="1" noMove="1" noResize="1" noEditPoints="1" noAdjustHandles="1" noChangeArrowheads="1" noChangeShapeType="1" noTextEdit="1"/>
+          </p:cNvSpPr>
+          <p:nvPr>
+            <p:extLst>
+              <p:ext uri="{386F3935-93C4-4BCD-93E2-E3B085C9AB24}">
+                <p16:designElem xmlns:p16="http://schemas.microsoft.com/office/powerpoint/2015/main" val="1"/>
+              </p:ext>
+            </p:extLst>
+          </p:nvPr>
+        </p:nvSpPr>
+        <p:spPr>
+          <a:xfrm>
+            <a:off x="0" y="0"/>
+            <a:ext cx="12192000" cy="6858000"/>
+          </a:xfrm>
+          <a:prstGeom prst="rect">
+            <a:avLst/>
+          </a:prstGeom>
+          <a:ln>
+            <a:noFill/>
+          </a:ln>
+        </p:spPr>
+        <p:style>
+          <a:lnRef idx="2">
+            <a:schemeClr val="accent1">
+              <a:shade val="50000"/>
+            </a:schemeClr>
+          </a:lnRef>
+          <a:fillRef idx="1">
+            <a:schemeClr val="accent1"/>
+          </a:fillRef>
+          <a:effectRef idx="0">
+            <a:schemeClr val="accent1"/>
+          </a:effectRef>
+          <a:fontRef idx="minor">
+            <a:schemeClr val="lt1"/>
+          </a:fontRef>
+        </p:style>
+        <p:txBody>
+          <a:bodyPr rtlCol="0" anchor="ctr"/>
+          <a:lstStyle/>
+          <a:p>
+            <a:pPr algn="ctr"/>
+            <a:endParaRPr lang="en-US"/>
+          </a:p>
+        </p:txBody>
+      </p:sp>
+      <p:sp>
+        <p:nvSpPr>
+          <p:cNvPr id="2" name="Title 1">
+            <a:extLst>
+              <a:ext uri="{FF2B5EF4-FFF2-40B4-BE49-F238E27FC236}">
+                <a16:creationId xmlns:a16="http://schemas.microsoft.com/office/drawing/2014/main" id="{22BA3E6E-F8AC-D39D-513A-4F8FF3330F89}"/>
+              </a:ext>
+            </a:extLst>
+          </p:cNvPr>
+          <p:cNvSpPr>
+            <a:spLocks noGrp="1"/>
+          </p:cNvSpPr>
+          <p:nvPr>
+            <p:ph type="title"/>
+          </p:nvPr>
+        </p:nvSpPr>
+        <p:spPr>
+          <a:xfrm>
+            <a:off x="638881" y="417576"/>
+            <a:ext cx="10909640" cy="1249394"/>
+          </a:xfrm>
+        </p:spPr>
+        <p:txBody>
+          <a:bodyPr vert="horz" lIns="91440" tIns="45720" rIns="91440" bIns="45720" rtlCol="0" anchor="ctr">
+            <a:normAutofit/>
+          </a:bodyPr>
+          <a:lstStyle/>
+          <a:p>
+            <a:pPr algn="ctr"/>
+            <a:r>
+              <a:rPr lang="en-US" sz="5000" b="1" kern="1200" dirty="0">
+                <a:solidFill>
+                  <a:schemeClr val="tx1"/>
+                </a:solidFill>
+                <a:latin typeface="+mj-lt"/>
+                <a:ea typeface="+mj-ea"/>
+                <a:cs typeface="+mj-cs"/>
+              </a:rPr>
+              <a:t>Top 10 countries by Cumulative </a:t>
+            </a:r>
+            <a:r>
+              <a:rPr lang="en-US" sz="5000" b="1" dirty="0"/>
+              <a:t>C</a:t>
+            </a:r>
+            <a:r>
+              <a:rPr lang="en-US" sz="5000" b="1" kern="1200" dirty="0">
+                <a:solidFill>
+                  <a:schemeClr val="tx1"/>
+                </a:solidFill>
+                <a:latin typeface="+mj-lt"/>
+                <a:ea typeface="+mj-ea"/>
+                <a:cs typeface="+mj-cs"/>
+              </a:rPr>
+              <a:t>ases</a:t>
+            </a:r>
+          </a:p>
+        </p:txBody>
+      </p:sp>
+      <p:sp>
+        <p:nvSpPr>
+          <p:cNvPr id="11" name="sketch line">
+            <a:extLst>
+              <a:ext uri="{FF2B5EF4-FFF2-40B4-BE49-F238E27FC236}">
+                <a16:creationId xmlns:a16="http://schemas.microsoft.com/office/drawing/2014/main" id="{670CEDEF-4F34-412E-84EE-329C1E936AF5}"/>
+              </a:ext>
+              <a:ext uri="{C183D7F6-B498-43B3-948B-1728B52AA6E4}">
+                <adec:decorative xmlns:adec="http://schemas.microsoft.com/office/drawing/2017/decorative" val="1"/>
+              </a:ext>
+            </a:extLst>
+          </p:cNvPr>
+          <p:cNvSpPr>
+            <a:spLocks noGrp="1" noRot="1" noChangeAspect="1" noMove="1" noResize="1" noEditPoints="1" noAdjustHandles="1" noChangeArrowheads="1" noChangeShapeType="1" noTextEdit="1"/>
+          </p:cNvSpPr>
+          <p:nvPr>
+            <p:extLst>
+              <p:ext uri="{386F3935-93C4-4BCD-93E2-E3B085C9AB24}">
+                <p16:designElem xmlns:p16="http://schemas.microsoft.com/office/powerpoint/2015/main" val="1"/>
+              </p:ext>
+            </p:extLst>
+          </p:nvPr>
+        </p:nvSpPr>
+        <p:spPr>
+          <a:xfrm>
+            <a:off x="3807702" y="1733454"/>
+            <a:ext cx="4572000" cy="18288"/>
+          </a:xfrm>
+          <a:custGeom>
+            <a:avLst/>
+            <a:gdLst>
+              <a:gd name="connsiteX0" fmla="*/ 0 w 4572000"/>
+              <a:gd name="connsiteY0" fmla="*/ 0 h 18288"/>
+              <a:gd name="connsiteX1" fmla="*/ 515983 w 4572000"/>
+              <a:gd name="connsiteY1" fmla="*/ 0 h 18288"/>
+              <a:gd name="connsiteX2" fmla="*/ 1031966 w 4572000"/>
+              <a:gd name="connsiteY2" fmla="*/ 0 h 18288"/>
+              <a:gd name="connsiteX3" fmla="*/ 1639389 w 4572000"/>
+              <a:gd name="connsiteY3" fmla="*/ 0 h 18288"/>
+              <a:gd name="connsiteX4" fmla="*/ 2383971 w 4572000"/>
+              <a:gd name="connsiteY4" fmla="*/ 0 h 18288"/>
+              <a:gd name="connsiteX5" fmla="*/ 2945674 w 4572000"/>
+              <a:gd name="connsiteY5" fmla="*/ 0 h 18288"/>
+              <a:gd name="connsiteX6" fmla="*/ 3507377 w 4572000"/>
+              <a:gd name="connsiteY6" fmla="*/ 0 h 18288"/>
+              <a:gd name="connsiteX7" fmla="*/ 4572000 w 4572000"/>
+              <a:gd name="connsiteY7" fmla="*/ 0 h 18288"/>
+              <a:gd name="connsiteX8" fmla="*/ 4572000 w 4572000"/>
+              <a:gd name="connsiteY8" fmla="*/ 18288 h 18288"/>
+              <a:gd name="connsiteX9" fmla="*/ 3873137 w 4572000"/>
+              <a:gd name="connsiteY9" fmla="*/ 18288 h 18288"/>
+              <a:gd name="connsiteX10" fmla="*/ 3311434 w 4572000"/>
+              <a:gd name="connsiteY10" fmla="*/ 18288 h 18288"/>
+              <a:gd name="connsiteX11" fmla="*/ 2749731 w 4572000"/>
+              <a:gd name="connsiteY11" fmla="*/ 18288 h 18288"/>
+              <a:gd name="connsiteX12" fmla="*/ 2050869 w 4572000"/>
+              <a:gd name="connsiteY12" fmla="*/ 18288 h 18288"/>
+              <a:gd name="connsiteX13" fmla="*/ 1306286 w 4572000"/>
+              <a:gd name="connsiteY13" fmla="*/ 18288 h 18288"/>
+              <a:gd name="connsiteX14" fmla="*/ 790303 w 4572000"/>
+              <a:gd name="connsiteY14" fmla="*/ 18288 h 18288"/>
+              <a:gd name="connsiteX15" fmla="*/ 0 w 4572000"/>
+              <a:gd name="connsiteY15" fmla="*/ 18288 h 18288"/>
+              <a:gd name="connsiteX16" fmla="*/ 0 w 4572000"/>
+              <a:gd name="connsiteY16" fmla="*/ 0 h 18288"/>
+            </a:gdLst>
+            <a:ahLst/>
+            <a:cxnLst>
+              <a:cxn ang="0">
+                <a:pos x="connsiteX0" y="connsiteY0"/>
+              </a:cxn>
+              <a:cxn ang="0">
+                <a:pos x="connsiteX1" y="connsiteY1"/>
+              </a:cxn>
+              <a:cxn ang="0">
+                <a:pos x="connsiteX2" y="connsiteY2"/>
+              </a:cxn>
+              <a:cxn ang="0">
+                <a:pos x="connsiteX3" y="connsiteY3"/>
+              </a:cxn>
+              <a:cxn ang="0">
+                <a:pos x="connsiteX4" y="connsiteY4"/>
+              </a:cxn>
+              <a:cxn ang="0">
+                <a:pos x="connsiteX5" y="connsiteY5"/>
+              </a:cxn>
+              <a:cxn ang="0">
+                <a:pos x="connsiteX6" y="connsiteY6"/>
+              </a:cxn>
+              <a:cxn ang="0">
+                <a:pos x="connsiteX7" y="connsiteY7"/>
+              </a:cxn>
+              <a:cxn ang="0">
+                <a:pos x="connsiteX8" y="connsiteY8"/>
+              </a:cxn>
+              <a:cxn ang="0">
+                <a:pos x="connsiteX9" y="connsiteY9"/>
+              </a:cxn>
+              <a:cxn ang="0">
+                <a:pos x="connsiteX10" y="connsiteY10"/>
+              </a:cxn>
+              <a:cxn ang="0">
+                <a:pos x="connsiteX11" y="connsiteY11"/>
+              </a:cxn>
+              <a:cxn ang="0">
+                <a:pos x="connsiteX12" y="connsiteY12"/>
+              </a:cxn>
+              <a:cxn ang="0">
+                <a:pos x="connsiteX13" y="connsiteY13"/>
+              </a:cxn>
+              <a:cxn ang="0">
+                <a:pos x="connsiteX14" y="connsiteY14"/>
+              </a:cxn>
+              <a:cxn ang="0">
+                <a:pos x="connsiteX15" y="connsiteY15"/>
+              </a:cxn>
+              <a:cxn ang="0">
+                <a:pos x="connsiteX16" y="connsiteY16"/>
+              </a:cxn>
+            </a:cxnLst>
+            <a:rect l="l" t="t" r="r" b="b"/>
+            <a:pathLst>
+              <a:path w="4572000" h="18288" fill="none" extrusionOk="0">
+                <a:moveTo>
+                  <a:pt x="0" y="0"/>
+                </a:moveTo>
+                <a:cubicBezTo>
+                  <a:pt x="105156" y="-20963"/>
+                  <a:pt x="340432" y="822"/>
+                  <a:pt x="515983" y="0"/>
+                </a:cubicBezTo>
+                <a:cubicBezTo>
+                  <a:pt x="691534" y="-822"/>
+                  <a:pt x="850679" y="16479"/>
+                  <a:pt x="1031966" y="0"/>
+                </a:cubicBezTo>
+                <a:cubicBezTo>
+                  <a:pt x="1213253" y="-16479"/>
+                  <a:pt x="1443646" y="-18730"/>
+                  <a:pt x="1639389" y="0"/>
+                </a:cubicBezTo>
+                <a:cubicBezTo>
+                  <a:pt x="1835132" y="18730"/>
+                  <a:pt x="2159975" y="18531"/>
+                  <a:pt x="2383971" y="0"/>
+                </a:cubicBezTo>
+                <a:cubicBezTo>
+                  <a:pt x="2607967" y="-18531"/>
+                  <a:pt x="2719096" y="-12030"/>
+                  <a:pt x="2945674" y="0"/>
+                </a:cubicBezTo>
+                <a:cubicBezTo>
+                  <a:pt x="3172252" y="12030"/>
+                  <a:pt x="3269167" y="27666"/>
+                  <a:pt x="3507377" y="0"/>
+                </a:cubicBezTo>
+                <a:cubicBezTo>
+                  <a:pt x="3745587" y="-27666"/>
+                  <a:pt x="4116741" y="18705"/>
+                  <a:pt x="4572000" y="0"/>
+                </a:cubicBezTo>
+                <a:cubicBezTo>
+                  <a:pt x="4572895" y="8974"/>
+                  <a:pt x="4571454" y="9359"/>
+                  <a:pt x="4572000" y="18288"/>
+                </a:cubicBezTo>
+                <a:cubicBezTo>
+                  <a:pt x="4374698" y="3942"/>
+                  <a:pt x="4098874" y="-11042"/>
+                  <a:pt x="3873137" y="18288"/>
+                </a:cubicBezTo>
+                <a:cubicBezTo>
+                  <a:pt x="3647400" y="47618"/>
+                  <a:pt x="3517055" y="5421"/>
+                  <a:pt x="3311434" y="18288"/>
+                </a:cubicBezTo>
+                <a:cubicBezTo>
+                  <a:pt x="3105813" y="31155"/>
+                  <a:pt x="3025168" y="17856"/>
+                  <a:pt x="2749731" y="18288"/>
+                </a:cubicBezTo>
+                <a:cubicBezTo>
+                  <a:pt x="2474294" y="18720"/>
+                  <a:pt x="2291766" y="-14168"/>
+                  <a:pt x="2050869" y="18288"/>
+                </a:cubicBezTo>
+                <a:cubicBezTo>
+                  <a:pt x="1809972" y="50744"/>
+                  <a:pt x="1540276" y="46798"/>
+                  <a:pt x="1306286" y="18288"/>
+                </a:cubicBezTo>
+                <a:cubicBezTo>
+                  <a:pt x="1072296" y="-10222"/>
+                  <a:pt x="972445" y="19645"/>
+                  <a:pt x="790303" y="18288"/>
+                </a:cubicBezTo>
+                <a:cubicBezTo>
+                  <a:pt x="608161" y="16931"/>
+                  <a:pt x="200981" y="8241"/>
+                  <a:pt x="0" y="18288"/>
+                </a:cubicBezTo>
+                <a:cubicBezTo>
+                  <a:pt x="-229" y="14222"/>
+                  <a:pt x="509" y="5816"/>
+                  <a:pt x="0" y="0"/>
+                </a:cubicBezTo>
+                <a:close/>
+              </a:path>
+              <a:path w="4572000" h="18288" stroke="0" extrusionOk="0">
+                <a:moveTo>
+                  <a:pt x="0" y="0"/>
+                </a:moveTo>
+                <a:cubicBezTo>
+                  <a:pt x="143285" y="-9565"/>
+                  <a:pt x="327959" y="-11498"/>
+                  <a:pt x="561703" y="0"/>
+                </a:cubicBezTo>
+                <a:cubicBezTo>
+                  <a:pt x="795447" y="11498"/>
+                  <a:pt x="838260" y="18255"/>
+                  <a:pt x="1077686" y="0"/>
+                </a:cubicBezTo>
+                <a:cubicBezTo>
+                  <a:pt x="1317112" y="-18255"/>
+                  <a:pt x="1437472" y="23514"/>
+                  <a:pt x="1639389" y="0"/>
+                </a:cubicBezTo>
+                <a:cubicBezTo>
+                  <a:pt x="1841306" y="-23514"/>
+                  <a:pt x="2037142" y="-12551"/>
+                  <a:pt x="2292531" y="0"/>
+                </a:cubicBezTo>
+                <a:cubicBezTo>
+                  <a:pt x="2547920" y="12551"/>
+                  <a:pt x="2810436" y="-20352"/>
+                  <a:pt x="2991394" y="0"/>
+                </a:cubicBezTo>
+                <a:cubicBezTo>
+                  <a:pt x="3172352" y="20352"/>
+                  <a:pt x="3530025" y="-13347"/>
+                  <a:pt x="3735977" y="0"/>
+                </a:cubicBezTo>
+                <a:cubicBezTo>
+                  <a:pt x="3941929" y="13347"/>
+                  <a:pt x="4161497" y="34086"/>
+                  <a:pt x="4572000" y="0"/>
+                </a:cubicBezTo>
+                <a:cubicBezTo>
+                  <a:pt x="4571545" y="6162"/>
+                  <a:pt x="4571903" y="11775"/>
+                  <a:pt x="4572000" y="18288"/>
+                </a:cubicBezTo>
+                <a:cubicBezTo>
+                  <a:pt x="4228040" y="36490"/>
+                  <a:pt x="4199736" y="42557"/>
+                  <a:pt x="3873137" y="18288"/>
+                </a:cubicBezTo>
+                <a:cubicBezTo>
+                  <a:pt x="3546538" y="-5981"/>
+                  <a:pt x="3472124" y="16809"/>
+                  <a:pt x="3128554" y="18288"/>
+                </a:cubicBezTo>
+                <a:cubicBezTo>
+                  <a:pt x="2784984" y="19767"/>
+                  <a:pt x="2735896" y="-17781"/>
+                  <a:pt x="2383971" y="18288"/>
+                </a:cubicBezTo>
+                <a:cubicBezTo>
+                  <a:pt x="2032046" y="54357"/>
+                  <a:pt x="2019324" y="2920"/>
+                  <a:pt x="1867989" y="18288"/>
+                </a:cubicBezTo>
+                <a:cubicBezTo>
+                  <a:pt x="1716654" y="33656"/>
+                  <a:pt x="1418675" y="32575"/>
+                  <a:pt x="1169126" y="18288"/>
+                </a:cubicBezTo>
+                <a:cubicBezTo>
+                  <a:pt x="919577" y="4001"/>
+                  <a:pt x="798537" y="16165"/>
+                  <a:pt x="561703" y="18288"/>
+                </a:cubicBezTo>
+                <a:cubicBezTo>
+                  <a:pt x="324869" y="20411"/>
+                  <a:pt x="221395" y="-912"/>
+                  <a:pt x="0" y="18288"/>
+                </a:cubicBezTo>
+                <a:cubicBezTo>
+                  <a:pt x="766" y="10800"/>
+                  <a:pt x="-457" y="8180"/>
+                  <a:pt x="0" y="0"/>
+                </a:cubicBezTo>
+                <a:close/>
+              </a:path>
+            </a:pathLst>
+          </a:custGeom>
+          <a:solidFill>
+            <a:schemeClr val="accent2"/>
+          </a:solidFill>
+          <a:ln w="41275" cap="rnd">
+            <a:solidFill>
+              <a:schemeClr val="accent2"/>
+            </a:solidFill>
+            <a:round/>
+            <a:extLst>
+              <a:ext uri="{C807C97D-BFC1-408E-A445-0C87EB9F89A2}">
+                <ask:lineSketchStyleProps xmlns:ask="http://schemas.microsoft.com/office/drawing/2018/sketchyshapes" sd="2727557108">
+                  <a:prstGeom prst="rect">
+                    <a:avLst/>
+                  </a:prstGeom>
+                  <ask:type>
+                    <ask:lineSketchFreehand/>
+                  </ask:type>
+                </ask:lineSketchStyleProps>
+              </a:ext>
+            </a:extLst>
+          </a:ln>
+        </p:spPr>
+        <p:style>
+          <a:lnRef idx="2">
+            <a:schemeClr val="accent1">
+              <a:shade val="50000"/>
+            </a:schemeClr>
+          </a:lnRef>
+          <a:fillRef idx="1">
+            <a:schemeClr val="accent1"/>
+          </a:fillRef>
+          <a:effectRef idx="0">
+            <a:schemeClr val="accent1"/>
+          </a:effectRef>
+          <a:fontRef idx="minor">
+            <a:schemeClr val="lt1"/>
+          </a:fontRef>
+        </p:style>
+        <p:txBody>
+          <a:bodyPr rtlCol="0" anchor="ctr"/>
+          <a:lstStyle/>
+          <a:p>
+            <a:pPr algn="ctr"/>
+            <a:endParaRPr lang="en-US"/>
+          </a:p>
+        </p:txBody>
+      </p:sp>
+      <p:pic>
+        <p:nvPicPr>
+          <p:cNvPr id="4" name="Picture 3" descr="A graph with blue squares&#10;&#10;Description automatically generated">
+            <a:extLst>
+              <a:ext uri="{FF2B5EF4-FFF2-40B4-BE49-F238E27FC236}">
+                <a16:creationId xmlns:a16="http://schemas.microsoft.com/office/drawing/2014/main" id="{67A94DD5-2D61-5B83-5ED4-F092E0967DFE}"/>
               </a:ext>
             </a:extLst>
           </p:cNvPr>
@@ -23334,8 +23303,8 @@
         </p:blipFill>
         <p:spPr>
           <a:xfrm>
-            <a:off x="274321" y="599440"/>
-            <a:ext cx="11669794" cy="5679440"/>
+            <a:off x="319265" y="2520207"/>
+            <a:ext cx="11548872" cy="2829472"/>
           </a:xfrm>
           <a:prstGeom prst="rect">
             <a:avLst/>
@@ -23345,7 +23314,7 @@
     </p:spTree>
     <p:extLst>
       <p:ext uri="{BB962C8B-B14F-4D97-AF65-F5344CB8AC3E}">
-        <p14:creationId xmlns:p14="http://schemas.microsoft.com/office/powerpoint/2010/main" val="2492437374"/>
+        <p14:creationId xmlns:p14="http://schemas.microsoft.com/office/powerpoint/2010/main" val="3969244429"/>
       </p:ext>
     </p:extLst>
   </p:cSld>

</xml_diff>